<commit_message>
Extraction des regles d`association
</commit_message>
<xml_diff>
--- a/Présentation_Regles_association.pptx
+++ b/Présentation_Regles_association.pptx
@@ -5,7 +5,7 @@
     <p:sldMasterId id="2147483648" r:id="rId1"/>
   </p:sldMasterIdLst>
   <p:notesMasterIdLst>
-    <p:notesMasterId r:id="rId15"/>
+    <p:notesMasterId r:id="rId17"/>
   </p:notesMasterIdLst>
   <p:sldIdLst>
     <p:sldId id="256" r:id="rId2"/>
@@ -21,6 +21,8 @@
     <p:sldId id="274" r:id="rId12"/>
     <p:sldId id="275" r:id="rId13"/>
     <p:sldId id="276" r:id="rId14"/>
+    <p:sldId id="277" r:id="rId15"/>
+    <p:sldId id="278" r:id="rId16"/>
   </p:sldIdLst>
   <p:sldSz cx="18288000" cy="10287000"/>
   <p:notesSz cx="18288000" cy="10287000"/>
@@ -220,7 +222,7 @@
           <a:p>
             <a:fld id="{0CB4E5DC-D774-4BB1-B8E7-88313F89F51A}" type="datetimeFigureOut">
               <a:rPr lang="en-US" smtClean="0"/>
-              <a:t>3/14/2020</a:t>
+              <a:t>3/15/2020</a:t>
             </a:fld>
             <a:endParaRPr lang="en-US"/>
           </a:p>
@@ -618,28 +620,60 @@
           <a:p>
             <a:r>
               <a:rPr lang="fr-FR" dirty="0" smtClean="0"/>
+              <a:t>Il faut tester toutes les combinaisons : </a:t>
+            </a:r>
+          </a:p>
+          <a:p>
+            <a:r>
+              <a:rPr lang="fr-FR" dirty="0" smtClean="0"/>
+              <a:t>On commence par les items de </a:t>
+            </a:r>
+            <a:r>
+              <a:rPr lang="fr-FR" dirty="0" err="1" smtClean="0"/>
+              <a:t>card</a:t>
+            </a:r>
+            <a:r>
+              <a:rPr lang="fr-FR" dirty="0" smtClean="0"/>
+              <a:t>=2</a:t>
+            </a:r>
+          </a:p>
+          <a:p>
+            <a:r>
+              <a:rPr lang="fr-FR" dirty="0" smtClean="0"/>
+              <a:t>2 tests par </a:t>
+            </a:r>
+            <a:r>
+              <a:rPr lang="fr-FR" dirty="0" err="1" smtClean="0"/>
+              <a:t>itemset</a:t>
+            </a:r>
+            <a:r>
+              <a:rPr lang="fr-FR" dirty="0" smtClean="0"/>
+              <a:t> Tous les supports sont dispos dans le treillis, pas besoin de scanner la base</a:t>
+            </a:r>
+          </a:p>
+          <a:p>
+            <a:r>
+              <a:rPr lang="fr-FR" dirty="0" smtClean="0"/>
               <a:t>Les </a:t>
             </a:r>
             <a:r>
               <a:rPr lang="fr-FR" dirty="0" err="1" smtClean="0"/>
-              <a:t>Itemsets</a:t>
+              <a:t>Regles</a:t>
             </a:r>
             <a:r>
               <a:rPr lang="fr-FR" dirty="0" smtClean="0"/>
-              <a:t> fréquents</a:t>
+              <a:t> d association </a:t>
             </a:r>
             <a:r>
               <a:rPr lang="fr-FR" baseline="0" dirty="0" smtClean="0"/>
-              <a:t> après extraction sont :</a:t>
-            </a:r>
-          </a:p>
-          <a:p>
-            <a:r>
-              <a:rPr lang="en-US" sz="1200" b="1" dirty="0" smtClean="0"/>
-              <a:t>{p1}, {p2}, {p3} ,{p1,p2}, {p1,p4}, {p2,p3} {p1,p2,p3}               </a:t>
-            </a:r>
-          </a:p>
-          <a:p>
+              <a:t>après extraction sont :</a:t>
+            </a:r>
+          </a:p>
+          <a:p>
+            <a:r>
+              <a:rPr lang="fr-FR" sz="1200" b="1" dirty="0" smtClean="0"/>
+              <a:t>P1-&gt;p3 , p3-&gt;p1 </a:t>
+            </a:r>
             <a:endParaRPr lang="fr-FR" dirty="0" smtClean="0"/>
           </a:p>
           <a:p>
@@ -674,6 +708,265 @@
     <p:extLst>
       <p:ext uri="{BB962C8B-B14F-4D97-AF65-F5344CB8AC3E}">
         <p14:creationId xmlns:p14="http://schemas.microsoft.com/office/powerpoint/2010/main" val="2519092766"/>
+      </p:ext>
+    </p:extLst>
+  </p:cSld>
+  <p:clrMapOvr>
+    <a:masterClrMapping/>
+  </p:clrMapOvr>
+</p:notes>
+</file>
+
+<file path=ppt/notesSlides/notesSlide11.xml><?xml version="1.0" encoding="utf-8"?>
+<p:notes xmlns:a="http://schemas.openxmlformats.org/drawingml/2006/main" xmlns:r="http://schemas.openxmlformats.org/officeDocument/2006/relationships" xmlns:p="http://schemas.openxmlformats.org/presentationml/2006/main">
+  <p:cSld>
+    <p:spTree>
+      <p:nvGrpSpPr>
+        <p:cNvPr id="1" name=""/>
+        <p:cNvGrpSpPr/>
+        <p:nvPr/>
+      </p:nvGrpSpPr>
+      <p:grpSpPr>
+        <a:xfrm>
+          <a:off x="0" y="0"/>
+          <a:ext cx="0" cy="0"/>
+          <a:chOff x="0" y="0"/>
+          <a:chExt cx="0" cy="0"/>
+        </a:xfrm>
+      </p:grpSpPr>
+      <p:sp>
+        <p:nvSpPr>
+          <p:cNvPr id="2" name="Espace réservé de l'image des diapositives 1"/>
+          <p:cNvSpPr>
+            <a:spLocks noGrp="1" noRot="1" noChangeAspect="1"/>
+          </p:cNvSpPr>
+          <p:nvPr>
+            <p:ph type="sldImg"/>
+          </p:nvPr>
+        </p:nvSpPr>
+        <p:spPr/>
+      </p:sp>
+      <p:sp>
+        <p:nvSpPr>
+          <p:cNvPr id="3" name="Espace réservé des notes 2"/>
+          <p:cNvSpPr>
+            <a:spLocks noGrp="1"/>
+          </p:cNvSpPr>
+          <p:nvPr>
+            <p:ph type="body" idx="1"/>
+          </p:nvPr>
+        </p:nvSpPr>
+        <p:spPr/>
+        <p:txBody>
+          <a:bodyPr/>
+          <a:lstStyle/>
+          <a:p>
+            <a:r>
+              <a:rPr lang="fr-FR" dirty="0" smtClean="0"/>
+              <a:t>Les items de </a:t>
+            </a:r>
+            <a:r>
+              <a:rPr lang="fr-FR" dirty="0" err="1" smtClean="0"/>
+              <a:t>card</a:t>
+            </a:r>
+            <a:r>
+              <a:rPr lang="fr-FR" dirty="0" smtClean="0"/>
+              <a:t>=3</a:t>
+            </a:r>
+            <a:endParaRPr lang="fr-FR" dirty="0" smtClean="0"/>
+          </a:p>
+          <a:p>
+            <a:pPr marL="0" marR="0" indent="0" algn="l" defTabSz="914400" rtl="0" eaLnBrk="1" fontAlgn="auto" latinLnBrk="0" hangingPunct="1">
+              <a:lnSpc>
+                <a:spcPct val="100000"/>
+              </a:lnSpc>
+              <a:spcBef>
+                <a:spcPts val="0"/>
+              </a:spcBef>
+              <a:spcAft>
+                <a:spcPts val="0"/>
+              </a:spcAft>
+              <a:buClrTx/>
+              <a:buSzTx/>
+              <a:buFontTx/>
+              <a:buNone/>
+              <a:tabLst/>
+              <a:defRPr/>
+            </a:pPr>
+            <a:r>
+              <a:rPr lang="fr-FR" dirty="0" smtClean="0"/>
+              <a:t>On</a:t>
+            </a:r>
+            <a:r>
+              <a:rPr lang="fr-FR" baseline="0" dirty="0" smtClean="0"/>
+              <a:t> a une seule </a:t>
+            </a:r>
+            <a:r>
+              <a:rPr lang="fr-FR" dirty="0" err="1" smtClean="0"/>
+              <a:t>Regle</a:t>
+            </a:r>
+            <a:r>
+              <a:rPr lang="fr-FR" dirty="0" smtClean="0"/>
+              <a:t> d`association </a:t>
+            </a:r>
+            <a:r>
+              <a:rPr lang="fr-FR" baseline="0" dirty="0" smtClean="0"/>
+              <a:t>:</a:t>
+            </a:r>
+          </a:p>
+          <a:p>
+            <a:pPr marL="0" marR="0" indent="0" algn="l" defTabSz="914400" rtl="0" eaLnBrk="1" fontAlgn="auto" latinLnBrk="0" hangingPunct="1">
+              <a:lnSpc>
+                <a:spcPct val="100000"/>
+              </a:lnSpc>
+              <a:spcBef>
+                <a:spcPts val="0"/>
+              </a:spcBef>
+              <a:spcAft>
+                <a:spcPts val="0"/>
+              </a:spcAft>
+              <a:buClrTx/>
+              <a:buSzTx/>
+              <a:buFontTx/>
+              <a:buNone/>
+              <a:tabLst/>
+              <a:defRPr/>
+            </a:pPr>
+            <a:r>
+              <a:rPr lang="en-US" sz="1200" b="1" dirty="0" smtClean="0"/>
+              <a:t>{p1,p2}  -&gt; {p3}  avec </a:t>
+            </a:r>
+            <a:r>
+              <a:rPr lang="en-US" sz="1200" b="1" dirty="0" err="1" smtClean="0"/>
+              <a:t>une</a:t>
+            </a:r>
+            <a:r>
+              <a:rPr lang="en-US" sz="1200" b="1" dirty="0" smtClean="0"/>
+              <a:t> </a:t>
+            </a:r>
+            <a:r>
+              <a:rPr lang="en-US" sz="1200" b="1" dirty="0" err="1" smtClean="0"/>
+              <a:t>confiance</a:t>
+            </a:r>
+            <a:r>
+              <a:rPr lang="en-US" sz="1200" b="1" dirty="0" smtClean="0"/>
+              <a:t> de 100%</a:t>
+            </a:r>
+            <a:endParaRPr lang="fr-FR" baseline="0" dirty="0" smtClean="0"/>
+          </a:p>
+        </p:txBody>
+      </p:sp>
+      <p:sp>
+        <p:nvSpPr>
+          <p:cNvPr id="4" name="Espace réservé du numéro de diapositive 3"/>
+          <p:cNvSpPr>
+            <a:spLocks noGrp="1"/>
+          </p:cNvSpPr>
+          <p:nvPr>
+            <p:ph type="sldNum" sz="quarter" idx="10"/>
+          </p:nvPr>
+        </p:nvSpPr>
+        <p:spPr/>
+        <p:txBody>
+          <a:bodyPr/>
+          <a:lstStyle/>
+          <a:p>
+            <a:fld id="{0DA38212-553E-41BB-83EE-DAE07C13F9C0}" type="slidenum">
+              <a:rPr lang="en-US" smtClean="0"/>
+              <a:t>14</a:t>
+            </a:fld>
+            <a:endParaRPr lang="en-US"/>
+          </a:p>
+        </p:txBody>
+      </p:sp>
+    </p:spTree>
+    <p:extLst>
+      <p:ext uri="{BB962C8B-B14F-4D97-AF65-F5344CB8AC3E}">
+        <p14:creationId xmlns:p14="http://schemas.microsoft.com/office/powerpoint/2010/main" val="1313049959"/>
+      </p:ext>
+    </p:extLst>
+  </p:cSld>
+  <p:clrMapOvr>
+    <a:masterClrMapping/>
+  </p:clrMapOvr>
+</p:notes>
+</file>
+
+<file path=ppt/notesSlides/notesSlide12.xml><?xml version="1.0" encoding="utf-8"?>
+<p:notes xmlns:a="http://schemas.openxmlformats.org/drawingml/2006/main" xmlns:r="http://schemas.openxmlformats.org/officeDocument/2006/relationships" xmlns:p="http://schemas.openxmlformats.org/presentationml/2006/main">
+  <p:cSld>
+    <p:spTree>
+      <p:nvGrpSpPr>
+        <p:cNvPr id="1" name=""/>
+        <p:cNvGrpSpPr/>
+        <p:nvPr/>
+      </p:nvGrpSpPr>
+      <p:grpSpPr>
+        <a:xfrm>
+          <a:off x="0" y="0"/>
+          <a:ext cx="0" cy="0"/>
+          <a:chOff x="0" y="0"/>
+          <a:chExt cx="0" cy="0"/>
+        </a:xfrm>
+      </p:grpSpPr>
+      <p:sp>
+        <p:nvSpPr>
+          <p:cNvPr id="2" name="Espace réservé de l'image des diapositives 1"/>
+          <p:cNvSpPr>
+            <a:spLocks noGrp="1" noRot="1" noChangeAspect="1"/>
+          </p:cNvSpPr>
+          <p:nvPr>
+            <p:ph type="sldImg"/>
+          </p:nvPr>
+        </p:nvSpPr>
+        <p:spPr/>
+      </p:sp>
+      <p:sp>
+        <p:nvSpPr>
+          <p:cNvPr id="3" name="Espace réservé des notes 2"/>
+          <p:cNvSpPr>
+            <a:spLocks noGrp="1"/>
+          </p:cNvSpPr>
+          <p:nvPr>
+            <p:ph type="body" idx="1"/>
+          </p:nvPr>
+        </p:nvSpPr>
+        <p:spPr/>
+        <p:txBody>
+          <a:bodyPr/>
+          <a:lstStyle/>
+          <a:p>
+            <a:endParaRPr lang="en-US" dirty="0"/>
+          </a:p>
+        </p:txBody>
+      </p:sp>
+      <p:sp>
+        <p:nvSpPr>
+          <p:cNvPr id="4" name="Espace réservé du numéro de diapositive 3"/>
+          <p:cNvSpPr>
+            <a:spLocks noGrp="1"/>
+          </p:cNvSpPr>
+          <p:nvPr>
+            <p:ph type="sldNum" sz="quarter" idx="10"/>
+          </p:nvPr>
+        </p:nvSpPr>
+        <p:spPr/>
+        <p:txBody>
+          <a:bodyPr/>
+          <a:lstStyle/>
+          <a:p>
+            <a:fld id="{0DA38212-553E-41BB-83EE-DAE07C13F9C0}" type="slidenum">
+              <a:rPr lang="en-US" smtClean="0"/>
+              <a:t>15</a:t>
+            </a:fld>
+            <a:endParaRPr lang="en-US"/>
+          </a:p>
+        </p:txBody>
+      </p:sp>
+    </p:spTree>
+    <p:extLst>
+      <p:ext uri="{BB962C8B-B14F-4D97-AF65-F5344CB8AC3E}">
+        <p14:creationId xmlns:p14="http://schemas.microsoft.com/office/powerpoint/2010/main" val="1272439469"/>
       </p:ext>
     </p:extLst>
   </p:cSld>
@@ -2618,17 +2911,7 @@
                 <a:latin typeface="Georgia"/>
                 <a:cs typeface="Georgia"/>
               </a:rPr>
-              <a:t> </a:t>
-            </a:r>
-            <a:r>
-              <a:rPr lang="en-US" sz="1200" spc="65" dirty="0" smtClean="0">
-                <a:solidFill>
-                  <a:srgbClr val="323232"/>
-                </a:solidFill>
-                <a:latin typeface="Georgia"/>
-                <a:cs typeface="Georgia"/>
-              </a:rPr>
-              <a:t>Observation =un Caddie</a:t>
+              <a:t> Observation =un Caddie</a:t>
             </a:r>
           </a:p>
           <a:p>
@@ -2762,7 +3045,6 @@
               <a:rPr lang="en-US" baseline="0" dirty="0" smtClean="0"/>
               <a:t> </a:t>
             </a:r>
-            <a:endParaRPr lang="en-US" baseline="0" dirty="0" smtClean="0"/>
           </a:p>
           <a:p>
             <a:pPr marL="12700">
@@ -2775,11 +3057,7 @@
             </a:pPr>
             <a:r>
               <a:rPr lang="fr-FR" sz="1200" b="1" dirty="0" smtClean="0"/>
-              <a:t>Ex</a:t>
-            </a:r>
-            <a:r>
-              <a:rPr lang="fr-FR" sz="1200" b="1" dirty="0" smtClean="0"/>
-              <a:t>.   </a:t>
+              <a:t>Ex.   </a:t>
             </a:r>
             <a:r>
               <a:rPr lang="fr-FR" sz="1200" dirty="0" smtClean="0"/>
@@ -2920,27 +3198,7 @@
                   </a:schemeClr>
                 </a:solidFill>
               </a:rPr>
-              <a:t>{ </a:t>
-            </a:r>
-            <a:r>
-              <a:rPr lang="en-US" sz="1200" b="1" dirty="0" smtClean="0">
-                <a:solidFill>
-                  <a:schemeClr val="accent2">
-                    <a:lumMod val="75000"/>
-                  </a:schemeClr>
-                </a:solidFill>
-              </a:rPr>
-              <a:t>FROMAGE</a:t>
-            </a:r>
-            <a:r>
-              <a:rPr lang="en-US" sz="1200" b="1" dirty="0" smtClean="0">
-                <a:solidFill>
-                  <a:schemeClr val="accent2">
-                    <a:lumMod val="75000"/>
-                  </a:schemeClr>
-                </a:solidFill>
-              </a:rPr>
-              <a:t>  }  --&gt;  </a:t>
+              <a:t>{ FROMAGE  }  --&gt;  </a:t>
             </a:r>
             <a:r>
               <a:rPr lang="en-US" sz="1200" b="1" dirty="0" smtClean="0">
@@ -2961,25 +3219,8 @@
                   </a:schemeClr>
                 </a:solidFill>
               </a:rPr>
-              <a:t>{ </a:t>
-            </a:r>
-            <a:r>
-              <a:rPr lang="en-US" sz="1200" b="1" dirty="0" smtClean="0">
-                <a:solidFill>
-                  <a:schemeClr val="accent2">
-                    <a:lumMod val="75000"/>
-                  </a:schemeClr>
-                </a:solidFill>
-              </a:rPr>
-              <a:t>VIANDE} </a:t>
-            </a:r>
-            <a:endParaRPr lang="en-US" sz="1200" b="1" dirty="0" smtClean="0">
-              <a:solidFill>
-                <a:schemeClr val="accent2">
-                  <a:lumMod val="75000"/>
-                </a:schemeClr>
-              </a:solidFill>
-            </a:endParaRPr>
+              <a:t>{ VIANDE} </a:t>
+            </a:r>
           </a:p>
           <a:p>
             <a:pPr>
@@ -3033,25 +3274,11 @@
                   </a:schemeClr>
                 </a:solidFill>
               </a:rPr>
-              <a:t>{FROMAGE, </a:t>
-            </a:r>
-            <a:r>
-              <a:rPr lang="en-US" sz="1200" b="1" dirty="0" smtClean="0">
-                <a:solidFill>
-                  <a:schemeClr val="accent2">
-                    <a:lumMod val="75000"/>
-                  </a:schemeClr>
-                </a:solidFill>
-              </a:rPr>
-              <a:t>VIANDE</a:t>
+              <a:t>{FROMAGE, VIANDE</a:t>
             </a:r>
             <a:r>
               <a:rPr lang="en-US" sz="1200" b="1" dirty="0" smtClean="0"/>
-              <a:t>} </a:t>
-            </a:r>
-            <a:r>
-              <a:rPr lang="en-US" sz="1200" b="1" dirty="0" smtClean="0"/>
-              <a:t>= </a:t>
+              <a:t>} = </a:t>
             </a:r>
             <a:r>
               <a:rPr lang="en-US" sz="1200" b="1" dirty="0" smtClean="0">
@@ -3141,18 +3368,7 @@
                 </a:solidFill>
                 <a:cs typeface="Times New Roman"/>
               </a:rPr>
-              <a:t> </a:t>
-            </a:r>
-            <a:r>
-              <a:rPr lang="fr-FR" sz="1200" b="1" dirty="0" smtClean="0">
-                <a:solidFill>
-                  <a:schemeClr val="accent2">
-                    <a:lumMod val="75000"/>
-                  </a:schemeClr>
-                </a:solidFill>
-                <a:cs typeface="Times New Roman"/>
-              </a:rPr>
-              <a:t>2/6=0.33</a:t>
+              <a:t> 2/6=0.33</a:t>
             </a:r>
           </a:p>
           <a:p>
@@ -3259,14 +3475,6 @@
               </a:rPr>
               <a:t>2/4=0,5 (50%)                                                                     </a:t>
             </a:r>
-            <a:endParaRPr lang="en-US" sz="1200" b="1" dirty="0" smtClean="0">
-              <a:solidFill>
-                <a:schemeClr val="accent2">
-                  <a:lumMod val="75000"/>
-                </a:schemeClr>
-              </a:solidFill>
-              <a:cs typeface="Times New Roman"/>
-            </a:endParaRPr>
           </a:p>
           <a:p>
             <a:pPr marL="12700">
@@ -3372,7 +3580,6 @@
               <a:rPr lang="en-US" baseline="0" dirty="0" smtClean="0"/>
               <a:t> </a:t>
             </a:r>
-            <a:endParaRPr lang="en-US" baseline="0" dirty="0" smtClean="0"/>
           </a:p>
           <a:p>
             <a:pPr marL="0" marR="0" indent="0" algn="l" defTabSz="914400" rtl="0" eaLnBrk="1" fontAlgn="auto" latinLnBrk="0" hangingPunct="1">
@@ -4005,7 +4212,7 @@
           <a:p>
             <a:fld id="{1D8BD707-D9CF-40AE-B4C6-C98DA3205C09}" type="datetimeFigureOut">
               <a:rPr lang="en-US"/>
-              <a:t>3/14/2020</a:t>
+              <a:t>3/15/2020</a:t>
             </a:fld>
             <a:endParaRPr lang="en-US"/>
           </a:p>
@@ -4180,7 +4387,7 @@
           <a:p>
             <a:fld id="{1D8BD707-D9CF-40AE-B4C6-C98DA3205C09}" type="datetimeFigureOut">
               <a:rPr lang="en-US"/>
-              <a:t>3/14/2020</a:t>
+              <a:t>3/15/2020</a:t>
             </a:fld>
             <a:endParaRPr lang="en-US"/>
           </a:p>
@@ -4394,7 +4601,7 @@
           <a:p>
             <a:fld id="{1D8BD707-D9CF-40AE-B4C6-C98DA3205C09}" type="datetimeFigureOut">
               <a:rPr lang="en-US"/>
-              <a:t>3/14/2020</a:t>
+              <a:t>3/15/2020</a:t>
             </a:fld>
             <a:endParaRPr lang="en-US"/>
           </a:p>
@@ -4542,7 +4749,7 @@
           <a:p>
             <a:fld id="{1D8BD707-D9CF-40AE-B4C6-C98DA3205C09}" type="datetimeFigureOut">
               <a:rPr lang="en-US"/>
-              <a:t>3/14/2020</a:t>
+              <a:t>3/15/2020</a:t>
             </a:fld>
             <a:endParaRPr lang="en-US"/>
           </a:p>
@@ -4719,7 +4926,7 @@
           <a:p>
             <a:fld id="{1D8BD707-D9CF-40AE-B4C6-C98DA3205C09}" type="datetimeFigureOut">
               <a:rPr lang="en-US"/>
-              <a:t>3/14/2020</a:t>
+              <a:t>3/15/2020</a:t>
             </a:fld>
             <a:endParaRPr lang="en-US"/>
           </a:p>
@@ -4942,7 +5149,7 @@
           <a:p>
             <a:fld id="{1D8BD707-D9CF-40AE-B4C6-C98DA3205C09}" type="datetimeFigureOut">
               <a:rPr lang="en-US"/>
-              <a:t>3/14/2020</a:t>
+              <a:t>3/15/2020</a:t>
             </a:fld>
             <a:endParaRPr lang="en-US"/>
           </a:p>
@@ -7128,13 +7335,13 @@
           <p:nvPr>
             <p:extLst>
               <p:ext uri="{D42A27DB-BD31-4B8C-83A1-F6EECF244321}">
-                <p14:modId xmlns:p14="http://schemas.microsoft.com/office/powerpoint/2010/main" val="4062290532"/>
+                <p14:modId xmlns:p14="http://schemas.microsoft.com/office/powerpoint/2010/main" val="4267400234"/>
               </p:ext>
             </p:extLst>
           </p:nvPr>
         </p:nvGraphicFramePr>
         <p:xfrm>
-          <a:off x="13849374" y="1181099"/>
+          <a:off x="13849374" y="1333500"/>
           <a:ext cx="4237000" cy="3200400"/>
         </p:xfrm>
         <a:graphic>
@@ -7187,6 +7394,10 @@
                     <a:lstStyle/>
                     <a:p>
                       <a:pPr algn="ctr"/>
+                      <a:r>
+                        <a:rPr lang="en-US" sz="2400" b="1" dirty="0" err="1" smtClean="0"/>
+                        <a:t>num</a:t>
+                      </a:r>
                       <a:endParaRPr lang="en-US" sz="2400" b="1" dirty="0"/>
                     </a:p>
                   </a:txBody>
@@ -8161,7 +8372,7 @@
         </p:nvSpPr>
         <p:spPr>
           <a:xfrm>
-            <a:off x="3313" y="-19238"/>
+            <a:off x="-2577" y="0"/>
             <a:ext cx="18288000" cy="10287000"/>
           </a:xfrm>
           <a:custGeom>
@@ -9519,11 +9730,19 @@
                   <a:srgbClr val="00B050"/>
                 </a:solidFill>
               </a:rPr>
-              <a:t>4                       3             5                  1</a:t>
+              <a:t>4                       3             5                  </a:t>
+            </a:r>
+            <a:r>
+              <a:rPr lang="en-US" sz="4800" b="1" dirty="0" smtClean="0">
+                <a:solidFill>
+                  <a:srgbClr val="FF0000"/>
+                </a:solidFill>
+              </a:rPr>
+              <a:t>1</a:t>
             </a:r>
             <a:endParaRPr lang="en-US" sz="4800" b="1" dirty="0">
               <a:solidFill>
-                <a:srgbClr val="00B050"/>
+                <a:srgbClr val="FF0000"/>
               </a:solidFill>
             </a:endParaRPr>
           </a:p>
@@ -9565,11 +9784,51 @@
                   <a:srgbClr val="00B050"/>
                 </a:solidFill>
               </a:rPr>
-              <a:t>                 4                  0                  3                   0             0</a:t>
+              <a:t>                 4                 </a:t>
+            </a:r>
+            <a:r>
+              <a:rPr lang="en-US" sz="4800" b="1" dirty="0" smtClean="0">
+                <a:solidFill>
+                  <a:srgbClr val="FF0000"/>
+                </a:solidFill>
+              </a:rPr>
+              <a:t> 0                  </a:t>
+            </a:r>
+            <a:r>
+              <a:rPr lang="en-US" sz="4800" b="1" dirty="0" smtClean="0">
+                <a:solidFill>
+                  <a:srgbClr val="00B050"/>
+                </a:solidFill>
+              </a:rPr>
+              <a:t>3                   </a:t>
+            </a:r>
+            <a:r>
+              <a:rPr lang="en-US" sz="4800" b="1" dirty="0" smtClean="0">
+                <a:solidFill>
+                  <a:srgbClr val="FF0000"/>
+                </a:solidFill>
+              </a:rPr>
+              <a:t>0</a:t>
+            </a:r>
+            <a:r>
+              <a:rPr lang="en-US" sz="4800" b="1" dirty="0" smtClean="0">
+                <a:solidFill>
+                  <a:srgbClr val="00B050"/>
+                </a:solidFill>
+              </a:rPr>
+              <a:t>             </a:t>
+            </a:r>
+            <a:r>
+              <a:rPr lang="en-US" sz="4800" b="1" dirty="0" smtClean="0">
+                <a:solidFill>
+                  <a:srgbClr val="FF0000"/>
+                </a:solidFill>
+              </a:rPr>
+              <a:t>0</a:t>
             </a:r>
             <a:endParaRPr lang="en-US" sz="4800" b="1" dirty="0">
               <a:solidFill>
-                <a:srgbClr val="00B050"/>
+                <a:srgbClr val="FF0000"/>
               </a:solidFill>
             </a:endParaRPr>
           </a:p>
@@ -9611,7 +9870,23 @@
                   <a:srgbClr val="00B050"/>
                 </a:solidFill>
               </a:rPr>
-              <a:t>                          0                            0                       0                              </a:t>
+              <a:t>                          </a:t>
+            </a:r>
+            <a:r>
+              <a:rPr lang="en-US" sz="4800" b="1" dirty="0" smtClean="0">
+                <a:solidFill>
+                  <a:srgbClr val="FF0000"/>
+                </a:solidFill>
+              </a:rPr>
+              <a:t>0                            0                       0</a:t>
+            </a:r>
+            <a:r>
+              <a:rPr lang="en-US" sz="4800" b="1" dirty="0" smtClean="0">
+                <a:solidFill>
+                  <a:srgbClr val="00B050"/>
+                </a:solidFill>
+              </a:rPr>
+              <a:t>                              </a:t>
             </a:r>
             <a:endParaRPr lang="en-US" sz="4800" b="1" dirty="0">
               <a:solidFill>
@@ -9646,7 +9921,7 @@
             <a:r>
               <a:rPr lang="en-US" sz="4800" b="1" dirty="0">
                 <a:solidFill>
-                  <a:srgbClr val="00B050"/>
+                  <a:srgbClr val="FF0000"/>
                 </a:solidFill>
               </a:rPr>
               <a:t>0</a:t>
@@ -9733,7 +10008,7 @@
             <a:r>
               <a:rPr lang="fr-FR" sz="4400" b="1" dirty="0" err="1">
                 <a:solidFill>
-                  <a:srgbClr val="00B050"/>
+                  <a:srgbClr val="FFC000"/>
                 </a:solidFill>
               </a:rPr>
               <a:t>sup.min</a:t>
@@ -9741,14 +10016,14 @@
             <a:r>
               <a:rPr lang="fr-FR" sz="4400" b="1" dirty="0">
                 <a:solidFill>
-                  <a:srgbClr val="00B050"/>
+                  <a:srgbClr val="FFC000"/>
                 </a:solidFill>
               </a:rPr>
               <a:t> = 2 </a:t>
             </a:r>
             <a:endParaRPr lang="en-US" sz="4400" b="1" dirty="0">
               <a:solidFill>
-                <a:srgbClr val="00B050"/>
+                <a:srgbClr val="FFC000"/>
               </a:solidFill>
             </a:endParaRPr>
           </a:p>
@@ -10315,6 +10590,76 @@
           </a:p>
         </p:txBody>
       </p:sp>
+      <p:cxnSp>
+        <p:nvCxnSpPr>
+          <p:cNvPr id="66" name="Connecteur droit 65"/>
+          <p:cNvCxnSpPr/>
+          <p:nvPr/>
+        </p:nvCxnSpPr>
+        <p:spPr>
+          <a:xfrm flipH="1" flipV="1">
+            <a:off x="6669798" y="6322492"/>
+            <a:ext cx="1439830" cy="298099"/>
+          </a:xfrm>
+          <a:prstGeom prst="line">
+            <a:avLst/>
+          </a:prstGeom>
+          <a:ln>
+            <a:solidFill>
+              <a:srgbClr val="FF0000"/>
+            </a:solidFill>
+          </a:ln>
+        </p:spPr>
+        <p:style>
+          <a:lnRef idx="3">
+            <a:schemeClr val="dk1"/>
+          </a:lnRef>
+          <a:fillRef idx="0">
+            <a:schemeClr val="dk1"/>
+          </a:fillRef>
+          <a:effectRef idx="2">
+            <a:schemeClr val="dk1"/>
+          </a:effectRef>
+          <a:fontRef idx="minor">
+            <a:schemeClr val="tx1"/>
+          </a:fontRef>
+        </p:style>
+      </p:cxnSp>
+      <p:cxnSp>
+        <p:nvCxnSpPr>
+          <p:cNvPr id="68" name="Connecteur droit 67"/>
+          <p:cNvCxnSpPr/>
+          <p:nvPr/>
+        </p:nvCxnSpPr>
+        <p:spPr>
+          <a:xfrm flipH="1">
+            <a:off x="6817727" y="6031914"/>
+            <a:ext cx="1034108" cy="819571"/>
+          </a:xfrm>
+          <a:prstGeom prst="line">
+            <a:avLst/>
+          </a:prstGeom>
+          <a:ln>
+            <a:solidFill>
+              <a:srgbClr val="FF0000"/>
+            </a:solidFill>
+          </a:ln>
+        </p:spPr>
+        <p:style>
+          <a:lnRef idx="3">
+            <a:schemeClr val="dk1"/>
+          </a:lnRef>
+          <a:fillRef idx="0">
+            <a:schemeClr val="dk1"/>
+          </a:fillRef>
+          <a:effectRef idx="2">
+            <a:schemeClr val="dk1"/>
+          </a:effectRef>
+          <a:fontRef idx="minor">
+            <a:schemeClr val="tx1"/>
+          </a:fontRef>
+        </p:style>
+      </p:cxnSp>
     </p:spTree>
     <p:extLst>
       <p:ext uri="{BB962C8B-B14F-4D97-AF65-F5344CB8AC3E}">
@@ -10662,15 +11007,11 @@
             </a:r>
             <a:r>
               <a:rPr lang="en-US" sz="3600" b="1" dirty="0" smtClean="0"/>
-              <a:t>             </a:t>
+              <a:t>{p1,p3}                                            {</a:t>
             </a:r>
             <a:r>
               <a:rPr lang="en-US" sz="3600" b="1" dirty="0" smtClean="0"/>
-              <a:t>                </a:t>
-            </a:r>
-            <a:r>
-              <a:rPr lang="en-US" sz="3600" b="1" dirty="0" smtClean="0"/>
-              <a:t>{p1,p4}              {p2,p3}            </a:t>
+              <a:t>p2,p3}            </a:t>
             </a:r>
             <a:endParaRPr lang="en-US" sz="3600" b="1" dirty="0"/>
           </a:p>
@@ -10768,36 +11109,6 @@
       </p:cxnSp>
       <p:cxnSp>
         <p:nvCxnSpPr>
-          <p:cNvPr id="26" name="Connecteur droit 25"/>
-          <p:cNvCxnSpPr/>
-          <p:nvPr/>
-        </p:nvCxnSpPr>
-        <p:spPr>
-          <a:xfrm>
-            <a:off x="5791200" y="5718416"/>
-            <a:ext cx="2667000" cy="1110912"/>
-          </a:xfrm>
-          <a:prstGeom prst="line">
-            <a:avLst/>
-          </a:prstGeom>
-        </p:spPr>
-        <p:style>
-          <a:lnRef idx="3">
-            <a:schemeClr val="accent2"/>
-          </a:lnRef>
-          <a:fillRef idx="0">
-            <a:schemeClr val="accent2"/>
-          </a:fillRef>
-          <a:effectRef idx="2">
-            <a:schemeClr val="accent2"/>
-          </a:effectRef>
-          <a:fontRef idx="minor">
-            <a:schemeClr val="tx1"/>
-          </a:fontRef>
-        </p:style>
-      </p:cxnSp>
-      <p:cxnSp>
-        <p:nvCxnSpPr>
           <p:cNvPr id="29" name="Connecteur droit 28"/>
           <p:cNvCxnSpPr/>
           <p:nvPr/>
@@ -11140,31 +11451,7 @@
                   <a:srgbClr val="00B050"/>
                 </a:solidFill>
               </a:rPr>
-              <a:t>                 4                  </a:t>
-            </a:r>
-            <a:r>
-              <a:rPr lang="en-US" sz="4800" b="1" dirty="0" smtClean="0">
-                <a:solidFill>
-                  <a:srgbClr val="00B050"/>
-                </a:solidFill>
-              </a:rPr>
-              <a:t>                    </a:t>
-            </a:r>
-            <a:r>
-              <a:rPr lang="en-US" sz="4800" b="1" dirty="0" smtClean="0">
-                <a:solidFill>
-                  <a:srgbClr val="00B050"/>
-                </a:solidFill>
-              </a:rPr>
-              <a:t>3                   </a:t>
-            </a:r>
-            <a:r>
-              <a:rPr lang="en-US" sz="4800" b="1" dirty="0" smtClean="0">
-                <a:solidFill>
-                  <a:srgbClr val="00B050"/>
-                </a:solidFill>
-              </a:rPr>
-              <a:t>           </a:t>
+              <a:t>                 4                                      3                              </a:t>
             </a:r>
             <a:endParaRPr lang="en-US" sz="4800" b="1" dirty="0">
               <a:solidFill>
@@ -11210,15 +11497,7 @@
                   <a:srgbClr val="00B050"/>
                 </a:solidFill>
               </a:rPr>
-              <a:t>                          </a:t>
-            </a:r>
-            <a:r>
-              <a:rPr lang="en-US" sz="4800" b="1" dirty="0" smtClean="0">
-                <a:solidFill>
-                  <a:srgbClr val="00B050"/>
-                </a:solidFill>
-              </a:rPr>
-              <a:t>                             </a:t>
+              <a:t>                                                       </a:t>
             </a:r>
             <a:endParaRPr lang="en-US" sz="4800" b="1" dirty="0">
               <a:solidFill>
@@ -11307,7 +11586,7 @@
             <a:r>
               <a:rPr lang="fr-FR" sz="4400" b="1" dirty="0" err="1">
                 <a:solidFill>
-                  <a:srgbClr val="00B050"/>
+                  <a:srgbClr val="FFC000"/>
                 </a:solidFill>
               </a:rPr>
               <a:t>sup.min</a:t>
@@ -11315,14 +11594,14 @@
             <a:r>
               <a:rPr lang="fr-FR" sz="4400" b="1" dirty="0">
                 <a:solidFill>
-                  <a:srgbClr val="00B050"/>
+                  <a:srgbClr val="FFC000"/>
                 </a:solidFill>
               </a:rPr>
               <a:t> = 2 </a:t>
             </a:r>
             <a:endParaRPr lang="en-US" sz="4400" b="1" dirty="0">
               <a:solidFill>
-                <a:srgbClr val="00B050"/>
+                <a:srgbClr val="FFC000"/>
               </a:solidFill>
             </a:endParaRPr>
           </a:p>
@@ -11373,7 +11652,7 @@
         </p:nvSpPr>
         <p:spPr>
           <a:xfrm>
-            <a:off x="3313" y="20519"/>
+            <a:off x="-32870" y="-16936"/>
             <a:ext cx="18288000" cy="10287000"/>
           </a:xfrm>
           <a:custGeom>
@@ -11406,48 +11685,6 @@
           <a:solidFill>
             <a:srgbClr val="F5EDE7"/>
           </a:solidFill>
-        </p:spPr>
-        <p:txBody>
-          <a:bodyPr wrap="square" lIns="0" tIns="0" rIns="0" bIns="0" rtlCol="0"/>
-          <a:lstStyle/>
-          <a:p>
-            <a:endParaRPr/>
-          </a:p>
-        </p:txBody>
-      </p:sp>
-      <p:sp>
-        <p:nvSpPr>
-          <p:cNvPr id="9" name="object 9"/>
-          <p:cNvSpPr/>
-          <p:nvPr/>
-        </p:nvSpPr>
-        <p:spPr>
-          <a:xfrm>
-            <a:off x="38100" y="3086100"/>
-            <a:ext cx="2019300" cy="0"/>
-          </a:xfrm>
-          <a:custGeom>
-            <a:avLst/>
-            <a:gdLst/>
-            <a:ahLst/>
-            <a:cxnLst/>
-            <a:rect l="l" t="t" r="r" b="b"/>
-            <a:pathLst>
-              <a:path w="2019300">
-                <a:moveTo>
-                  <a:pt x="0" y="0"/>
-                </a:moveTo>
-                <a:lnTo>
-                  <a:pt x="2019299" y="0"/>
-                </a:lnTo>
-              </a:path>
-            </a:pathLst>
-          </a:custGeom>
-          <a:ln w="38099">
-            <a:solidFill>
-              <a:srgbClr val="323232"/>
-            </a:solidFill>
-          </a:ln>
         </p:spPr>
         <p:txBody>
           <a:bodyPr wrap="square" lIns="0" tIns="0" rIns="0" bIns="0" rtlCol="0"/>
@@ -11583,46 +11820,14 @@
       </p:pic>
       <p:sp>
         <p:nvSpPr>
-          <p:cNvPr id="6" name="Titre 5"/>
-          <p:cNvSpPr>
-            <a:spLocks noGrp="1"/>
-          </p:cNvSpPr>
-          <p:nvPr>
-            <p:ph type="title"/>
-          </p:nvPr>
-        </p:nvSpPr>
-        <p:spPr>
-          <a:xfrm>
-            <a:off x="9867900" y="3461910"/>
-            <a:ext cx="454308" cy="603247"/>
-          </a:xfrm>
-        </p:spPr>
-        <p:txBody>
-          <a:bodyPr/>
-          <a:lstStyle/>
-          <a:p>
-            <a:r>
-              <a:rPr lang="en-US" sz="4000" i="0" dirty="0" smtClean="0">
-                <a:latin typeface="+mn-lt"/>
-              </a:rPr>
-              <a:t>Ø</a:t>
-            </a:r>
-            <a:endParaRPr lang="en-US" sz="4000" i="0" dirty="0">
-              <a:latin typeface="+mn-lt"/>
-            </a:endParaRPr>
-          </a:p>
-        </p:txBody>
-      </p:sp>
-      <p:sp>
-        <p:nvSpPr>
-          <p:cNvPr id="19" name="ZoneTexte 18"/>
+          <p:cNvPr id="114" name="ZoneTexte 113"/>
           <p:cNvSpPr txBox="1"/>
           <p:nvPr/>
         </p:nvSpPr>
         <p:spPr>
           <a:xfrm>
-            <a:off x="4784165" y="5136743"/>
-            <a:ext cx="7299670" cy="707886"/>
+            <a:off x="5715000" y="1333500"/>
+            <a:ext cx="6594391" cy="584775"/>
           </a:xfrm>
           <a:prstGeom prst="rect">
             <a:avLst/>
@@ -11636,23 +11841,47 @@
           <a:lstStyle/>
           <a:p>
             <a:r>
-              <a:rPr lang="en-US" sz="4000" b="1" dirty="0" smtClean="0"/>
-              <a:t>{p1}                      {p2}              {p3}       </a:t>
-            </a:r>
-            <a:endParaRPr lang="en-US" sz="4000" b="1" dirty="0"/>
+              <a:rPr lang="fr-FR" sz="3200" b="1" i="1" dirty="0" smtClean="0">
+                <a:solidFill>
+                  <a:srgbClr val="C00000"/>
+                </a:solidFill>
+              </a:rPr>
+              <a:t>Extraction des </a:t>
+            </a:r>
+            <a:r>
+              <a:rPr lang="fr-FR" sz="3200" b="1" i="1" dirty="0" err="1" smtClean="0">
+                <a:solidFill>
+                  <a:srgbClr val="C00000"/>
+                </a:solidFill>
+              </a:rPr>
+              <a:t>Regles</a:t>
+            </a:r>
+            <a:r>
+              <a:rPr lang="fr-FR" sz="3200" b="1" i="1" dirty="0" smtClean="0">
+                <a:solidFill>
+                  <a:srgbClr val="C00000"/>
+                </a:solidFill>
+              </a:rPr>
+              <a:t> d`association</a:t>
+            </a:r>
+            <a:endParaRPr lang="en-US" sz="3200" b="1" i="1" dirty="0">
+              <a:solidFill>
+                <a:srgbClr val="C00000"/>
+              </a:solidFill>
+            </a:endParaRPr>
           </a:p>
         </p:txBody>
       </p:sp>
       <p:sp>
         <p:nvSpPr>
-          <p:cNvPr id="8" name="ZoneTexte 7"/>
+          <p:cNvPr id="4" name="ZoneTexte 3"/>
           <p:cNvSpPr txBox="1"/>
           <p:nvPr/>
         </p:nvSpPr>
         <p:spPr>
           <a:xfrm>
-            <a:off x="2438400" y="6683453"/>
-            <a:ext cx="10025378" cy="646331"/>
+            <a:off x="9489991" y="4323695"/>
+            <a:ext cx="6969209" cy="5016758"/>
           </a:xfrm>
           <a:prstGeom prst="rect">
             <a:avLst/>
@@ -11666,39 +11895,220 @@
           <a:lstStyle/>
           <a:p>
             <a:r>
-              <a:rPr lang="en-US" sz="3600" b="1" dirty="0" smtClean="0"/>
-              <a:t>{p1,p2}          </a:t>
-            </a:r>
-            <a:r>
-              <a:rPr lang="en-US" sz="3600" b="1" dirty="0"/>
-              <a:t> </a:t>
-            </a:r>
-            <a:r>
-              <a:rPr lang="en-US" sz="3600" b="1" dirty="0" smtClean="0"/>
-              <a:t>             </a:t>
-            </a:r>
-            <a:r>
-              <a:rPr lang="en-US" sz="3600" b="1" dirty="0" smtClean="0"/>
-              <a:t>                </a:t>
-            </a:r>
-            <a:r>
-              <a:rPr lang="en-US" sz="3600" b="1" dirty="0" smtClean="0"/>
-              <a:t>{p1,p4}              {p2,p3}            </a:t>
-            </a:r>
-            <a:endParaRPr lang="en-US" sz="3600" b="1" dirty="0"/>
+              <a:rPr lang="fr-FR" sz="3200" b="1" dirty="0" smtClean="0"/>
+              <a:t>P1-&gt;p2 </a:t>
+            </a:r>
+            <a:r>
+              <a:rPr lang="fr-FR" sz="3200" b="1" dirty="0"/>
+              <a:t>: </a:t>
+            </a:r>
+            <a:r>
+              <a:rPr lang="fr-FR" sz="3200" b="1" dirty="0" err="1"/>
+              <a:t>conf</a:t>
+            </a:r>
+            <a:r>
+              <a:rPr lang="fr-FR" sz="3200" b="1" dirty="0"/>
+              <a:t>. = 2/4 = 50% </a:t>
+            </a:r>
+            <a:r>
+              <a:rPr lang="fr-FR" sz="3200" b="1" dirty="0">
+                <a:solidFill>
+                  <a:srgbClr val="FF0000"/>
+                </a:solidFill>
+              </a:rPr>
+              <a:t>(refusé) </a:t>
+            </a:r>
+            <a:endParaRPr lang="fr-FR" sz="3200" b="1" dirty="0" smtClean="0">
+              <a:solidFill>
+                <a:srgbClr val="FF0000"/>
+              </a:solidFill>
+            </a:endParaRPr>
+          </a:p>
+          <a:p>
+            <a:r>
+              <a:rPr lang="fr-FR" sz="3200" b="1" dirty="0" smtClean="0"/>
+              <a:t>P2-&gt;p1 </a:t>
+            </a:r>
+            <a:r>
+              <a:rPr lang="fr-FR" sz="3200" b="1" dirty="0"/>
+              <a:t>: </a:t>
+            </a:r>
+            <a:r>
+              <a:rPr lang="fr-FR" sz="3200" b="1" dirty="0" err="1"/>
+              <a:t>conf</a:t>
+            </a:r>
+            <a:r>
+              <a:rPr lang="fr-FR" sz="3200" b="1" dirty="0"/>
+              <a:t>. = 2/3 = 67% </a:t>
+            </a:r>
+            <a:r>
+              <a:rPr lang="fr-FR" sz="3200" b="1" dirty="0">
+                <a:solidFill>
+                  <a:srgbClr val="FF0000"/>
+                </a:solidFill>
+              </a:rPr>
+              <a:t>(refusé</a:t>
+            </a:r>
+            <a:r>
+              <a:rPr lang="fr-FR" sz="3200" b="1" dirty="0" smtClean="0">
+                <a:solidFill>
+                  <a:srgbClr val="FF0000"/>
+                </a:solidFill>
+              </a:rPr>
+              <a:t>)</a:t>
+            </a:r>
+          </a:p>
+          <a:p>
+            <a:endParaRPr lang="fr-FR" sz="3200" b="1" dirty="0" smtClean="0"/>
+          </a:p>
+          <a:p>
+            <a:endParaRPr lang="fr-FR" sz="3200" b="1" dirty="0"/>
+          </a:p>
+          <a:p>
+            <a:r>
+              <a:rPr lang="fr-FR" sz="3200" b="1" dirty="0" smtClean="0"/>
+              <a:t>P1-&gt;p3 </a:t>
+            </a:r>
+            <a:r>
+              <a:rPr lang="fr-FR" sz="3200" b="1" dirty="0"/>
+              <a:t>: </a:t>
+            </a:r>
+            <a:r>
+              <a:rPr lang="fr-FR" sz="3200" b="1" dirty="0" err="1"/>
+              <a:t>conf</a:t>
+            </a:r>
+            <a:r>
+              <a:rPr lang="fr-FR" sz="3200" b="1" dirty="0"/>
+              <a:t>. = 4/4 = 100% </a:t>
+            </a:r>
+            <a:r>
+              <a:rPr lang="fr-FR" sz="3200" b="1" dirty="0">
+                <a:solidFill>
+                  <a:srgbClr val="00B050"/>
+                </a:solidFill>
+              </a:rPr>
+              <a:t>(accepté) </a:t>
+            </a:r>
+            <a:endParaRPr lang="fr-FR" sz="3200" b="1" dirty="0" smtClean="0">
+              <a:solidFill>
+                <a:srgbClr val="00B050"/>
+              </a:solidFill>
+            </a:endParaRPr>
+          </a:p>
+          <a:p>
+            <a:r>
+              <a:rPr lang="fr-FR" sz="3200" b="1" dirty="0" smtClean="0"/>
+              <a:t>p3-&gt;p1 </a:t>
+            </a:r>
+            <a:r>
+              <a:rPr lang="fr-FR" sz="3200" b="1" dirty="0"/>
+              <a:t>: </a:t>
+            </a:r>
+            <a:r>
+              <a:rPr lang="fr-FR" sz="3200" b="1" dirty="0" err="1"/>
+              <a:t>conf</a:t>
+            </a:r>
+            <a:r>
+              <a:rPr lang="fr-FR" sz="3200" b="1" dirty="0"/>
+              <a:t>. = 4/5 = 80% </a:t>
+            </a:r>
+            <a:r>
+              <a:rPr lang="fr-FR" sz="3200" b="1" dirty="0">
+                <a:solidFill>
+                  <a:srgbClr val="00B050"/>
+                </a:solidFill>
+              </a:rPr>
+              <a:t>(accepté</a:t>
+            </a:r>
+            <a:r>
+              <a:rPr lang="fr-FR" sz="3200" b="1" dirty="0" smtClean="0">
+                <a:solidFill>
+                  <a:srgbClr val="00B050"/>
+                </a:solidFill>
+              </a:rPr>
+              <a:t>)</a:t>
+            </a:r>
+          </a:p>
+          <a:p>
+            <a:endParaRPr lang="fr-FR" sz="3200" b="1" dirty="0" smtClean="0"/>
+          </a:p>
+          <a:p>
+            <a:endParaRPr lang="fr-FR" sz="3200" b="1" dirty="0"/>
+          </a:p>
+          <a:p>
+            <a:r>
+              <a:rPr lang="fr-FR" sz="3200" b="1" dirty="0" smtClean="0"/>
+              <a:t>P2-&gt;p3 </a:t>
+            </a:r>
+            <a:r>
+              <a:rPr lang="fr-FR" sz="3200" b="1" dirty="0"/>
+              <a:t>: </a:t>
+            </a:r>
+            <a:r>
+              <a:rPr lang="fr-FR" sz="3200" b="1" dirty="0" err="1"/>
+              <a:t>conf</a:t>
+            </a:r>
+            <a:r>
+              <a:rPr lang="fr-FR" sz="3200" b="1" dirty="0"/>
+              <a:t>. = 3/3 = 100% </a:t>
+            </a:r>
+            <a:r>
+              <a:rPr lang="fr-FR" sz="3200" b="1" dirty="0">
+                <a:solidFill>
+                  <a:srgbClr val="00B050"/>
+                </a:solidFill>
+              </a:rPr>
+              <a:t>(accepté) </a:t>
+            </a:r>
+            <a:endParaRPr lang="fr-FR" sz="3200" b="1" dirty="0" smtClean="0">
+              <a:solidFill>
+                <a:srgbClr val="00B050"/>
+              </a:solidFill>
+            </a:endParaRPr>
+          </a:p>
+          <a:p>
+            <a:r>
+              <a:rPr lang="fr-FR" sz="3200" b="1" dirty="0" smtClean="0"/>
+              <a:t>P3-&gt;p2 </a:t>
+            </a:r>
+            <a:r>
+              <a:rPr lang="fr-FR" sz="3200" b="1" dirty="0"/>
+              <a:t>: </a:t>
+            </a:r>
+            <a:r>
+              <a:rPr lang="fr-FR" sz="3200" b="1" dirty="0" err="1"/>
+              <a:t>conf</a:t>
+            </a:r>
+            <a:r>
+              <a:rPr lang="fr-FR" sz="3200" b="1" dirty="0"/>
+              <a:t>. = 3/5 = 60% </a:t>
+            </a:r>
+            <a:r>
+              <a:rPr lang="fr-FR" sz="3200" b="1" dirty="0">
+                <a:solidFill>
+                  <a:srgbClr val="FF0000"/>
+                </a:solidFill>
+              </a:rPr>
+              <a:t>(refusé)  </a:t>
+            </a:r>
+            <a:endParaRPr lang="en-US" sz="3200" b="1" dirty="0">
+              <a:solidFill>
+                <a:srgbClr val="FF0000"/>
+              </a:solidFill>
+            </a:endParaRPr>
           </a:p>
         </p:txBody>
       </p:sp>
       <p:sp>
         <p:nvSpPr>
-          <p:cNvPr id="10" name="ZoneTexte 9"/>
+          <p:cNvPr id="5" name="ZoneTexte 4"/>
           <p:cNvSpPr txBox="1"/>
           <p:nvPr/>
         </p:nvSpPr>
         <p:spPr>
           <a:xfrm>
-            <a:off x="3737744" y="8447691"/>
-            <a:ext cx="3284011" cy="734409"/>
+            <a:off x="7391400" y="4613106"/>
+            <a:ext cx="1719730" cy="4693593"/>
           </a:xfrm>
           <a:prstGeom prst="rect">
             <a:avLst/>
@@ -11712,6 +12122,1426 @@
           <a:lstStyle/>
           <a:p>
             <a:r>
+              <a:rPr lang="en-US" sz="3600" b="1" dirty="0" smtClean="0"/>
+              <a:t>{p1,p2}</a:t>
+            </a:r>
+          </a:p>
+          <a:p>
+            <a:endParaRPr lang="en-US" sz="3600" b="1" dirty="0"/>
+          </a:p>
+          <a:p>
+            <a:endParaRPr lang="en-US" sz="900" b="1" dirty="0" smtClean="0"/>
+          </a:p>
+          <a:p>
+            <a:endParaRPr lang="en-US" sz="900" b="1" dirty="0"/>
+          </a:p>
+          <a:p>
+            <a:endParaRPr lang="en-US" sz="900" b="1" dirty="0" smtClean="0"/>
+          </a:p>
+          <a:p>
+            <a:endParaRPr lang="en-US" sz="900" b="1" dirty="0"/>
+          </a:p>
+          <a:p>
+            <a:endParaRPr lang="en-US" sz="900" b="1" dirty="0" smtClean="0"/>
+          </a:p>
+          <a:p>
+            <a:endParaRPr lang="en-US" sz="900" b="1" dirty="0" smtClean="0"/>
+          </a:p>
+          <a:p>
+            <a:r>
+              <a:rPr lang="en-US" sz="3600" b="1" dirty="0"/>
+              <a:t>{p1,p3</a:t>
+            </a:r>
+            <a:r>
+              <a:rPr lang="en-US" sz="3600" b="1" dirty="0" smtClean="0"/>
+              <a:t>}</a:t>
+            </a:r>
+          </a:p>
+          <a:p>
+            <a:endParaRPr lang="en-US" sz="3600" b="1" dirty="0"/>
+          </a:p>
+          <a:p>
+            <a:endParaRPr lang="en-US" sz="3600" b="1" dirty="0"/>
+          </a:p>
+          <a:p>
+            <a:endParaRPr lang="en-US" sz="1100" b="1" dirty="0" smtClean="0"/>
+          </a:p>
+          <a:p>
+            <a:r>
+              <a:rPr lang="en-US" sz="3600" b="1" dirty="0"/>
+              <a:t>{</a:t>
+            </a:r>
+            <a:r>
+              <a:rPr lang="en-US" sz="3600" b="1" dirty="0" smtClean="0"/>
+              <a:t>p2,p3}</a:t>
+            </a:r>
+          </a:p>
+          <a:p>
+            <a:endParaRPr lang="en-US" dirty="0"/>
+          </a:p>
+        </p:txBody>
+      </p:sp>
+      <p:sp>
+        <p:nvSpPr>
+          <p:cNvPr id="7" name="ZoneTexte 6"/>
+          <p:cNvSpPr txBox="1"/>
+          <p:nvPr/>
+        </p:nvSpPr>
+        <p:spPr>
+          <a:xfrm>
+            <a:off x="5564572" y="2834474"/>
+            <a:ext cx="7313228" cy="461665"/>
+          </a:xfrm>
+          <a:prstGeom prst="rect">
+            <a:avLst/>
+          </a:prstGeom>
+          <a:noFill/>
+        </p:spPr>
+        <p:txBody>
+          <a:bodyPr wrap="square" rtlCol="0">
+            <a:spAutoFit/>
+          </a:bodyPr>
+          <a:lstStyle/>
+          <a:p>
+            <a:r>
+              <a:rPr lang="fr-FR" sz="2400" b="1" dirty="0" smtClean="0">
+                <a:solidFill>
+                  <a:schemeClr val="accent6">
+                    <a:lumMod val="75000"/>
+                  </a:schemeClr>
+                </a:solidFill>
+              </a:rPr>
+              <a:t>1. Recherche </a:t>
+            </a:r>
+            <a:r>
+              <a:rPr lang="fr-FR" sz="2400" b="1" dirty="0">
+                <a:solidFill>
+                  <a:schemeClr val="accent6">
+                    <a:lumMod val="75000"/>
+                  </a:schemeClr>
+                </a:solidFill>
+              </a:rPr>
+              <a:t>des règles pour les </a:t>
+            </a:r>
+            <a:r>
+              <a:rPr lang="fr-FR" sz="2400" b="1" dirty="0" err="1">
+                <a:solidFill>
+                  <a:schemeClr val="accent6">
+                    <a:lumMod val="75000"/>
+                  </a:schemeClr>
+                </a:solidFill>
+              </a:rPr>
+              <a:t>itemsets</a:t>
+            </a:r>
+            <a:r>
+              <a:rPr lang="fr-FR" sz="2400" b="1" dirty="0">
+                <a:solidFill>
+                  <a:schemeClr val="accent6">
+                    <a:lumMod val="75000"/>
+                  </a:schemeClr>
+                </a:solidFill>
+              </a:rPr>
+              <a:t> de </a:t>
+            </a:r>
+            <a:r>
+              <a:rPr lang="fr-FR" sz="2400" b="1" dirty="0" err="1">
+                <a:solidFill>
+                  <a:schemeClr val="accent6">
+                    <a:lumMod val="75000"/>
+                  </a:schemeClr>
+                </a:solidFill>
+              </a:rPr>
+              <a:t>card</a:t>
+            </a:r>
+            <a:r>
+              <a:rPr lang="fr-FR" sz="2400" b="1" dirty="0">
+                <a:solidFill>
+                  <a:schemeClr val="accent6">
+                    <a:lumMod val="75000"/>
+                  </a:schemeClr>
+                </a:solidFill>
+              </a:rPr>
+              <a:t> = 2</a:t>
+            </a:r>
+            <a:endParaRPr lang="en-US" sz="2400" b="1" dirty="0">
+              <a:solidFill>
+                <a:schemeClr val="accent6">
+                  <a:lumMod val="75000"/>
+                </a:schemeClr>
+              </a:solidFill>
+            </a:endParaRPr>
+          </a:p>
+        </p:txBody>
+      </p:sp>
+      <p:sp>
+        <p:nvSpPr>
+          <p:cNvPr id="13" name="ZoneTexte 12"/>
+          <p:cNvSpPr txBox="1"/>
+          <p:nvPr/>
+        </p:nvSpPr>
+        <p:spPr>
+          <a:xfrm>
+            <a:off x="8768230" y="4143430"/>
+            <a:ext cx="685800" cy="1569660"/>
+          </a:xfrm>
+          <a:prstGeom prst="rect">
+            <a:avLst/>
+          </a:prstGeom>
+          <a:noFill/>
+        </p:spPr>
+        <p:txBody>
+          <a:bodyPr wrap="square" rtlCol="0">
+            <a:spAutoFit/>
+          </a:bodyPr>
+          <a:lstStyle/>
+          <a:p>
+            <a:r>
+              <a:rPr lang="en-US" sz="9600" b="1" dirty="0"/>
+              <a:t>{</a:t>
+            </a:r>
+            <a:endParaRPr lang="en-US" sz="9600" dirty="0"/>
+          </a:p>
+        </p:txBody>
+      </p:sp>
+      <p:sp>
+        <p:nvSpPr>
+          <p:cNvPr id="34" name="ZoneTexte 33"/>
+          <p:cNvSpPr txBox="1"/>
+          <p:nvPr/>
+        </p:nvSpPr>
+        <p:spPr>
+          <a:xfrm>
+            <a:off x="8852964" y="5955816"/>
+            <a:ext cx="685800" cy="1569660"/>
+          </a:xfrm>
+          <a:prstGeom prst="rect">
+            <a:avLst/>
+          </a:prstGeom>
+          <a:noFill/>
+        </p:spPr>
+        <p:txBody>
+          <a:bodyPr wrap="square" rtlCol="0">
+            <a:spAutoFit/>
+          </a:bodyPr>
+          <a:lstStyle/>
+          <a:p>
+            <a:r>
+              <a:rPr lang="en-US" sz="9600" b="1" dirty="0"/>
+              <a:t>{</a:t>
+            </a:r>
+            <a:endParaRPr lang="en-US" sz="9600" dirty="0"/>
+          </a:p>
+        </p:txBody>
+      </p:sp>
+      <p:sp>
+        <p:nvSpPr>
+          <p:cNvPr id="36" name="ZoneTexte 35"/>
+          <p:cNvSpPr txBox="1"/>
+          <p:nvPr/>
+        </p:nvSpPr>
+        <p:spPr>
+          <a:xfrm>
+            <a:off x="8909957" y="7893451"/>
+            <a:ext cx="685800" cy="1569660"/>
+          </a:xfrm>
+          <a:prstGeom prst="rect">
+            <a:avLst/>
+          </a:prstGeom>
+          <a:noFill/>
+        </p:spPr>
+        <p:txBody>
+          <a:bodyPr wrap="square" rtlCol="0">
+            <a:spAutoFit/>
+          </a:bodyPr>
+          <a:lstStyle/>
+          <a:p>
+            <a:r>
+              <a:rPr lang="en-US" sz="9600" b="1" dirty="0"/>
+              <a:t>{</a:t>
+            </a:r>
+            <a:endParaRPr lang="en-US" sz="9600" dirty="0"/>
+          </a:p>
+        </p:txBody>
+      </p:sp>
+      <p:graphicFrame>
+        <p:nvGraphicFramePr>
+          <p:cNvPr id="149" name="Tableau 148"/>
+          <p:cNvGraphicFramePr>
+            <a:graphicFrameLocks noGrp="1"/>
+          </p:cNvGraphicFramePr>
+          <p:nvPr>
+            <p:extLst>
+              <p:ext uri="{D42A27DB-BD31-4B8C-83A1-F6EECF244321}">
+                <p14:modId xmlns:p14="http://schemas.microsoft.com/office/powerpoint/2010/main" val="1437741931"/>
+              </p:ext>
+            </p:extLst>
+          </p:nvPr>
+        </p:nvGraphicFramePr>
+        <p:xfrm>
+          <a:off x="1295399" y="4717698"/>
+          <a:ext cx="5181600" cy="4083401"/>
+        </p:xfrm>
+        <a:graphic>
+          <a:graphicData uri="http://schemas.openxmlformats.org/drawingml/2006/table">
+            <a:tbl>
+              <a:tblPr firstRow="1" bandRow="1">
+                <a:tableStyleId>{5DA37D80-6434-44D0-A028-1B22A696006F}</a:tableStyleId>
+              </a:tblPr>
+              <a:tblGrid>
+                <a:gridCol w="1036320">
+                  <a:extLst>
+                    <a:ext uri="{9D8B030D-6E8A-4147-A177-3AD203B41FA5}">
+                      <a16:colId xmlns:a16="http://schemas.microsoft.com/office/drawing/2014/main" val="1953090983"/>
+                    </a:ext>
+                  </a:extLst>
+                </a:gridCol>
+                <a:gridCol w="1036320">
+                  <a:extLst>
+                    <a:ext uri="{9D8B030D-6E8A-4147-A177-3AD203B41FA5}">
+                      <a16:colId xmlns:a16="http://schemas.microsoft.com/office/drawing/2014/main" val="2805439471"/>
+                    </a:ext>
+                  </a:extLst>
+                </a:gridCol>
+                <a:gridCol w="1036320">
+                  <a:extLst>
+                    <a:ext uri="{9D8B030D-6E8A-4147-A177-3AD203B41FA5}">
+                      <a16:colId xmlns:a16="http://schemas.microsoft.com/office/drawing/2014/main" val="282802788"/>
+                    </a:ext>
+                  </a:extLst>
+                </a:gridCol>
+                <a:gridCol w="1036320">
+                  <a:extLst>
+                    <a:ext uri="{9D8B030D-6E8A-4147-A177-3AD203B41FA5}">
+                      <a16:colId xmlns:a16="http://schemas.microsoft.com/office/drawing/2014/main" val="1379743402"/>
+                    </a:ext>
+                  </a:extLst>
+                </a:gridCol>
+                <a:gridCol w="1036320">
+                  <a:extLst>
+                    <a:ext uri="{9D8B030D-6E8A-4147-A177-3AD203B41FA5}">
+                      <a16:colId xmlns:a16="http://schemas.microsoft.com/office/drawing/2014/main" val="1019358591"/>
+                    </a:ext>
+                  </a:extLst>
+                </a:gridCol>
+              </a:tblGrid>
+              <a:tr h="583343">
+                <a:tc>
+                  <a:txBody>
+                    <a:bodyPr/>
+                    <a:lstStyle/>
+                    <a:p>
+                      <a:pPr algn="ctr"/>
+                      <a:r>
+                        <a:rPr lang="en-US" sz="2400" b="1" dirty="0" err="1" smtClean="0"/>
+                        <a:t>num</a:t>
+                      </a:r>
+                      <a:endParaRPr lang="en-US" sz="2400" b="1" dirty="0"/>
+                    </a:p>
+                  </a:txBody>
+                  <a:tcPr/>
+                </a:tc>
+                <a:tc>
+                  <a:txBody>
+                    <a:bodyPr/>
+                    <a:lstStyle/>
+                    <a:p>
+                      <a:pPr algn="ctr"/>
+                      <a:r>
+                        <a:rPr lang="en-US" sz="2400" b="1" dirty="0" smtClean="0"/>
+                        <a:t>P1</a:t>
+                      </a:r>
+                      <a:endParaRPr lang="en-US" sz="2400" b="1" dirty="0"/>
+                    </a:p>
+                  </a:txBody>
+                  <a:tcPr/>
+                </a:tc>
+                <a:tc>
+                  <a:txBody>
+                    <a:bodyPr/>
+                    <a:lstStyle/>
+                    <a:p>
+                      <a:pPr algn="ctr"/>
+                      <a:r>
+                        <a:rPr lang="en-US" sz="2400" b="1" dirty="0" smtClean="0"/>
+                        <a:t>P2</a:t>
+                      </a:r>
+                      <a:endParaRPr lang="en-US" sz="2400" b="1" dirty="0"/>
+                    </a:p>
+                  </a:txBody>
+                  <a:tcPr/>
+                </a:tc>
+                <a:tc>
+                  <a:txBody>
+                    <a:bodyPr/>
+                    <a:lstStyle/>
+                    <a:p>
+                      <a:pPr algn="ctr"/>
+                      <a:r>
+                        <a:rPr lang="en-US" sz="2400" b="1" dirty="0" smtClean="0"/>
+                        <a:t>P3</a:t>
+                      </a:r>
+                      <a:endParaRPr lang="en-US" sz="2400" b="1" dirty="0"/>
+                    </a:p>
+                  </a:txBody>
+                  <a:tcPr/>
+                </a:tc>
+                <a:tc>
+                  <a:txBody>
+                    <a:bodyPr/>
+                    <a:lstStyle/>
+                    <a:p>
+                      <a:pPr algn="ctr"/>
+                      <a:r>
+                        <a:rPr lang="en-US" sz="2400" b="1" dirty="0" smtClean="0"/>
+                        <a:t>P4</a:t>
+                      </a:r>
+                      <a:endParaRPr lang="en-US" sz="2400" b="1" dirty="0"/>
+                    </a:p>
+                  </a:txBody>
+                  <a:tcPr/>
+                </a:tc>
+                <a:extLst>
+                  <a:ext uri="{0D108BD9-81ED-4DB2-BD59-A6C34878D82A}">
+                    <a16:rowId xmlns:a16="http://schemas.microsoft.com/office/drawing/2014/main" val="593726039"/>
+                  </a:ext>
+                </a:extLst>
+              </a:tr>
+              <a:tr h="583343">
+                <a:tc>
+                  <a:txBody>
+                    <a:bodyPr/>
+                    <a:lstStyle/>
+                    <a:p>
+                      <a:r>
+                        <a:rPr lang="en-US" sz="2400" b="1" dirty="0" smtClean="0"/>
+                        <a:t>01</a:t>
+                      </a:r>
+                      <a:endParaRPr lang="en-US" sz="2400" b="1" dirty="0"/>
+                    </a:p>
+                  </a:txBody>
+                  <a:tcPr/>
+                </a:tc>
+                <a:tc>
+                  <a:txBody>
+                    <a:bodyPr/>
+                    <a:lstStyle/>
+                    <a:p>
+                      <a:r>
+                        <a:rPr lang="en-US" sz="2400" b="1" dirty="0" smtClean="0"/>
+                        <a:t>1</a:t>
+                      </a:r>
+                      <a:endParaRPr lang="en-US" sz="2400" b="1" dirty="0"/>
+                    </a:p>
+                  </a:txBody>
+                  <a:tcPr/>
+                </a:tc>
+                <a:tc>
+                  <a:txBody>
+                    <a:bodyPr/>
+                    <a:lstStyle/>
+                    <a:p>
+                      <a:r>
+                        <a:rPr lang="en-US" sz="2400" b="1" dirty="0" smtClean="0"/>
+                        <a:t>1</a:t>
+                      </a:r>
+                      <a:endParaRPr lang="en-US" sz="2400" b="1" dirty="0"/>
+                    </a:p>
+                  </a:txBody>
+                  <a:tcPr/>
+                </a:tc>
+                <a:tc>
+                  <a:txBody>
+                    <a:bodyPr/>
+                    <a:lstStyle/>
+                    <a:p>
+                      <a:r>
+                        <a:rPr lang="en-US" sz="2400" b="1" dirty="0" smtClean="0"/>
+                        <a:t>1</a:t>
+                      </a:r>
+                      <a:endParaRPr lang="en-US" sz="2400" b="1" dirty="0"/>
+                    </a:p>
+                  </a:txBody>
+                  <a:tcPr/>
+                </a:tc>
+                <a:tc>
+                  <a:txBody>
+                    <a:bodyPr/>
+                    <a:lstStyle/>
+                    <a:p>
+                      <a:r>
+                        <a:rPr lang="en-US" sz="2400" b="1" dirty="0" smtClean="0"/>
+                        <a:t>0</a:t>
+                      </a:r>
+                      <a:endParaRPr lang="en-US" sz="2400" b="1" dirty="0"/>
+                    </a:p>
+                  </a:txBody>
+                  <a:tcPr/>
+                </a:tc>
+                <a:extLst>
+                  <a:ext uri="{0D108BD9-81ED-4DB2-BD59-A6C34878D82A}">
+                    <a16:rowId xmlns:a16="http://schemas.microsoft.com/office/drawing/2014/main" val="289757519"/>
+                  </a:ext>
+                </a:extLst>
+              </a:tr>
+              <a:tr h="583343">
+                <a:tc>
+                  <a:txBody>
+                    <a:bodyPr/>
+                    <a:lstStyle/>
+                    <a:p>
+                      <a:r>
+                        <a:rPr lang="en-US" sz="2400" b="1" dirty="0" smtClean="0"/>
+                        <a:t>02</a:t>
+                      </a:r>
+                      <a:endParaRPr lang="en-US" sz="2400" b="1" dirty="0"/>
+                    </a:p>
+                  </a:txBody>
+                  <a:tcPr/>
+                </a:tc>
+                <a:tc>
+                  <a:txBody>
+                    <a:bodyPr/>
+                    <a:lstStyle/>
+                    <a:p>
+                      <a:r>
+                        <a:rPr lang="en-US" sz="2400" b="1" dirty="0" smtClean="0"/>
+                        <a:t>1</a:t>
+                      </a:r>
+                      <a:endParaRPr lang="en-US" sz="2400" b="1" dirty="0"/>
+                    </a:p>
+                  </a:txBody>
+                  <a:tcPr/>
+                </a:tc>
+                <a:tc>
+                  <a:txBody>
+                    <a:bodyPr/>
+                    <a:lstStyle/>
+                    <a:p>
+                      <a:r>
+                        <a:rPr lang="en-US" sz="2400" b="1" dirty="0" smtClean="0"/>
+                        <a:t>0</a:t>
+                      </a:r>
+                      <a:endParaRPr lang="en-US" sz="2400" b="1" dirty="0"/>
+                    </a:p>
+                  </a:txBody>
+                  <a:tcPr/>
+                </a:tc>
+                <a:tc>
+                  <a:txBody>
+                    <a:bodyPr/>
+                    <a:lstStyle/>
+                    <a:p>
+                      <a:r>
+                        <a:rPr lang="en-US" sz="2400" b="1" dirty="0" smtClean="0"/>
+                        <a:t>1</a:t>
+                      </a:r>
+                      <a:endParaRPr lang="en-US" sz="2400" b="1" dirty="0"/>
+                    </a:p>
+                  </a:txBody>
+                  <a:tcPr/>
+                </a:tc>
+                <a:tc>
+                  <a:txBody>
+                    <a:bodyPr/>
+                    <a:lstStyle/>
+                    <a:p>
+                      <a:r>
+                        <a:rPr lang="en-US" sz="2400" b="1" dirty="0" smtClean="0"/>
+                        <a:t>0</a:t>
+                      </a:r>
+                      <a:endParaRPr lang="en-US" sz="2400" b="1" dirty="0"/>
+                    </a:p>
+                  </a:txBody>
+                  <a:tcPr/>
+                </a:tc>
+                <a:extLst>
+                  <a:ext uri="{0D108BD9-81ED-4DB2-BD59-A6C34878D82A}">
+                    <a16:rowId xmlns:a16="http://schemas.microsoft.com/office/drawing/2014/main" val="1224972536"/>
+                  </a:ext>
+                </a:extLst>
+              </a:tr>
+              <a:tr h="583343">
+                <a:tc>
+                  <a:txBody>
+                    <a:bodyPr/>
+                    <a:lstStyle/>
+                    <a:p>
+                      <a:r>
+                        <a:rPr lang="en-US" sz="2400" b="1" dirty="0" smtClean="0"/>
+                        <a:t>03</a:t>
+                      </a:r>
+                      <a:endParaRPr lang="en-US" sz="2400" b="1" dirty="0"/>
+                    </a:p>
+                  </a:txBody>
+                  <a:tcPr/>
+                </a:tc>
+                <a:tc>
+                  <a:txBody>
+                    <a:bodyPr/>
+                    <a:lstStyle/>
+                    <a:p>
+                      <a:r>
+                        <a:rPr lang="en-US" sz="2400" b="1" dirty="0" smtClean="0"/>
+                        <a:t>1</a:t>
+                      </a:r>
+                      <a:endParaRPr lang="en-US" sz="2400" b="1" dirty="0"/>
+                    </a:p>
+                  </a:txBody>
+                  <a:tcPr/>
+                </a:tc>
+                <a:tc>
+                  <a:txBody>
+                    <a:bodyPr/>
+                    <a:lstStyle/>
+                    <a:p>
+                      <a:r>
+                        <a:rPr lang="en-US" sz="2400" b="1" dirty="0" smtClean="0"/>
+                        <a:t>1</a:t>
+                      </a:r>
+                      <a:endParaRPr lang="en-US" sz="2400" b="1" dirty="0"/>
+                    </a:p>
+                  </a:txBody>
+                  <a:tcPr/>
+                </a:tc>
+                <a:tc>
+                  <a:txBody>
+                    <a:bodyPr/>
+                    <a:lstStyle/>
+                    <a:p>
+                      <a:r>
+                        <a:rPr lang="en-US" sz="2400" b="1" dirty="0" smtClean="0"/>
+                        <a:t>1</a:t>
+                      </a:r>
+                      <a:endParaRPr lang="en-US" sz="2400" b="1" dirty="0"/>
+                    </a:p>
+                  </a:txBody>
+                  <a:tcPr/>
+                </a:tc>
+                <a:tc>
+                  <a:txBody>
+                    <a:bodyPr/>
+                    <a:lstStyle/>
+                    <a:p>
+                      <a:r>
+                        <a:rPr lang="en-US" sz="2400" b="1" dirty="0" smtClean="0"/>
+                        <a:t>0</a:t>
+                      </a:r>
+                      <a:endParaRPr lang="en-US" sz="2400" b="1" dirty="0"/>
+                    </a:p>
+                  </a:txBody>
+                  <a:tcPr/>
+                </a:tc>
+                <a:extLst>
+                  <a:ext uri="{0D108BD9-81ED-4DB2-BD59-A6C34878D82A}">
+                    <a16:rowId xmlns:a16="http://schemas.microsoft.com/office/drawing/2014/main" val="1938161857"/>
+                  </a:ext>
+                </a:extLst>
+              </a:tr>
+              <a:tr h="583343">
+                <a:tc>
+                  <a:txBody>
+                    <a:bodyPr/>
+                    <a:lstStyle/>
+                    <a:p>
+                      <a:r>
+                        <a:rPr lang="en-US" sz="2400" b="1" dirty="0" smtClean="0"/>
+                        <a:t>04</a:t>
+                      </a:r>
+                      <a:endParaRPr lang="en-US" sz="2400" b="1" dirty="0"/>
+                    </a:p>
+                  </a:txBody>
+                  <a:tcPr/>
+                </a:tc>
+                <a:tc>
+                  <a:txBody>
+                    <a:bodyPr/>
+                    <a:lstStyle/>
+                    <a:p>
+                      <a:r>
+                        <a:rPr lang="en-US" sz="2400" b="1" dirty="0" smtClean="0"/>
+                        <a:t>1</a:t>
+                      </a:r>
+                      <a:endParaRPr lang="en-US" sz="2400" b="1" dirty="0"/>
+                    </a:p>
+                  </a:txBody>
+                  <a:tcPr/>
+                </a:tc>
+                <a:tc>
+                  <a:txBody>
+                    <a:bodyPr/>
+                    <a:lstStyle/>
+                    <a:p>
+                      <a:r>
+                        <a:rPr lang="en-US" sz="2400" b="1" dirty="0" smtClean="0"/>
+                        <a:t>1</a:t>
+                      </a:r>
+                      <a:endParaRPr lang="en-US" sz="2400" b="1" dirty="0"/>
+                    </a:p>
+                  </a:txBody>
+                  <a:tcPr/>
+                </a:tc>
+                <a:tc>
+                  <a:txBody>
+                    <a:bodyPr/>
+                    <a:lstStyle/>
+                    <a:p>
+                      <a:r>
+                        <a:rPr lang="en-US" sz="2400" b="1" dirty="0" smtClean="0"/>
+                        <a:t>0</a:t>
+                      </a:r>
+                      <a:endParaRPr lang="en-US" sz="2400" b="1" dirty="0"/>
+                    </a:p>
+                  </a:txBody>
+                  <a:tcPr/>
+                </a:tc>
+                <a:tc>
+                  <a:txBody>
+                    <a:bodyPr/>
+                    <a:lstStyle/>
+                    <a:p>
+                      <a:r>
+                        <a:rPr lang="en-US" sz="2400" b="1" dirty="0" smtClean="0"/>
+                        <a:t>0</a:t>
+                      </a:r>
+                      <a:endParaRPr lang="en-US" sz="2400" b="1" dirty="0"/>
+                    </a:p>
+                  </a:txBody>
+                  <a:tcPr/>
+                </a:tc>
+                <a:extLst>
+                  <a:ext uri="{0D108BD9-81ED-4DB2-BD59-A6C34878D82A}">
+                    <a16:rowId xmlns:a16="http://schemas.microsoft.com/office/drawing/2014/main" val="2586922304"/>
+                  </a:ext>
+                </a:extLst>
+              </a:tr>
+              <a:tr h="583343">
+                <a:tc>
+                  <a:txBody>
+                    <a:bodyPr/>
+                    <a:lstStyle/>
+                    <a:p>
+                      <a:r>
+                        <a:rPr lang="en-US" sz="2400" b="1" dirty="0" smtClean="0"/>
+                        <a:t>05</a:t>
+                      </a:r>
+                      <a:endParaRPr lang="en-US" sz="2400" b="1" dirty="0"/>
+                    </a:p>
+                  </a:txBody>
+                  <a:tcPr/>
+                </a:tc>
+                <a:tc>
+                  <a:txBody>
+                    <a:bodyPr/>
+                    <a:lstStyle/>
+                    <a:p>
+                      <a:r>
+                        <a:rPr lang="en-US" sz="2400" b="1" dirty="0" smtClean="0"/>
+                        <a:t>0</a:t>
+                      </a:r>
+                      <a:endParaRPr lang="en-US" sz="2400" b="1" dirty="0"/>
+                    </a:p>
+                  </a:txBody>
+                  <a:tcPr/>
+                </a:tc>
+                <a:tc>
+                  <a:txBody>
+                    <a:bodyPr/>
+                    <a:lstStyle/>
+                    <a:p>
+                      <a:r>
+                        <a:rPr lang="en-US" sz="2400" b="1" dirty="0" smtClean="0"/>
+                        <a:t>1</a:t>
+                      </a:r>
+                      <a:endParaRPr lang="en-US" sz="2400" b="1" dirty="0"/>
+                    </a:p>
+                  </a:txBody>
+                  <a:tcPr/>
+                </a:tc>
+                <a:tc>
+                  <a:txBody>
+                    <a:bodyPr/>
+                    <a:lstStyle/>
+                    <a:p>
+                      <a:r>
+                        <a:rPr lang="en-US" sz="2400" b="1" dirty="0" smtClean="0"/>
+                        <a:t>1</a:t>
+                      </a:r>
+                      <a:endParaRPr lang="en-US" sz="2400" b="1" dirty="0"/>
+                    </a:p>
+                  </a:txBody>
+                  <a:tcPr/>
+                </a:tc>
+                <a:tc>
+                  <a:txBody>
+                    <a:bodyPr/>
+                    <a:lstStyle/>
+                    <a:p>
+                      <a:r>
+                        <a:rPr lang="en-US" sz="2400" b="1" dirty="0" smtClean="0"/>
+                        <a:t>0</a:t>
+                      </a:r>
+                      <a:endParaRPr lang="en-US" sz="2400" b="1" dirty="0"/>
+                    </a:p>
+                  </a:txBody>
+                  <a:tcPr/>
+                </a:tc>
+                <a:extLst>
+                  <a:ext uri="{0D108BD9-81ED-4DB2-BD59-A6C34878D82A}">
+                    <a16:rowId xmlns:a16="http://schemas.microsoft.com/office/drawing/2014/main" val="3489723564"/>
+                  </a:ext>
+                </a:extLst>
+              </a:tr>
+              <a:tr h="583343">
+                <a:tc>
+                  <a:txBody>
+                    <a:bodyPr/>
+                    <a:lstStyle/>
+                    <a:p>
+                      <a:r>
+                        <a:rPr lang="en-US" sz="2400" b="1" dirty="0" smtClean="0"/>
+                        <a:t>06</a:t>
+                      </a:r>
+                      <a:endParaRPr lang="en-US" sz="2400" b="1" dirty="0"/>
+                    </a:p>
+                  </a:txBody>
+                  <a:tcPr/>
+                </a:tc>
+                <a:tc>
+                  <a:txBody>
+                    <a:bodyPr/>
+                    <a:lstStyle/>
+                    <a:p>
+                      <a:r>
+                        <a:rPr lang="en-US" sz="2400" b="1" dirty="0" smtClean="0"/>
+                        <a:t>0</a:t>
+                      </a:r>
+                      <a:endParaRPr lang="en-US" sz="2400" b="1" dirty="0"/>
+                    </a:p>
+                  </a:txBody>
+                  <a:tcPr/>
+                </a:tc>
+                <a:tc>
+                  <a:txBody>
+                    <a:bodyPr/>
+                    <a:lstStyle/>
+                    <a:p>
+                      <a:r>
+                        <a:rPr lang="en-US" sz="2400" b="1" dirty="0" smtClean="0"/>
+                        <a:t>0</a:t>
+                      </a:r>
+                      <a:endParaRPr lang="en-US" sz="2400" b="1" dirty="0"/>
+                    </a:p>
+                  </a:txBody>
+                  <a:tcPr/>
+                </a:tc>
+                <a:tc>
+                  <a:txBody>
+                    <a:bodyPr/>
+                    <a:lstStyle/>
+                    <a:p>
+                      <a:r>
+                        <a:rPr lang="en-US" sz="2400" b="1" dirty="0" smtClean="0"/>
+                        <a:t>0</a:t>
+                      </a:r>
+                      <a:endParaRPr lang="en-US" sz="2400" b="1" dirty="0"/>
+                    </a:p>
+                  </a:txBody>
+                  <a:tcPr/>
+                </a:tc>
+                <a:tc>
+                  <a:txBody>
+                    <a:bodyPr/>
+                    <a:lstStyle/>
+                    <a:p>
+                      <a:r>
+                        <a:rPr lang="en-US" sz="2400" b="1" dirty="0" smtClean="0"/>
+                        <a:t>1</a:t>
+                      </a:r>
+                      <a:endParaRPr lang="en-US" sz="2400" b="1" dirty="0"/>
+                    </a:p>
+                  </a:txBody>
+                  <a:tcPr/>
+                </a:tc>
+                <a:extLst>
+                  <a:ext uri="{0D108BD9-81ED-4DB2-BD59-A6C34878D82A}">
+                    <a16:rowId xmlns:a16="http://schemas.microsoft.com/office/drawing/2014/main" val="3442202262"/>
+                  </a:ext>
+                </a:extLst>
+              </a:tr>
+            </a:tbl>
+          </a:graphicData>
+        </a:graphic>
+      </p:graphicFrame>
+      <p:sp>
+        <p:nvSpPr>
+          <p:cNvPr id="150" name="ZoneTexte 149"/>
+          <p:cNvSpPr txBox="1"/>
+          <p:nvPr/>
+        </p:nvSpPr>
+        <p:spPr>
+          <a:xfrm>
+            <a:off x="13713283" y="3296139"/>
+            <a:ext cx="4541847" cy="769441"/>
+          </a:xfrm>
+          <a:prstGeom prst="rect">
+            <a:avLst/>
+          </a:prstGeom>
+          <a:noFill/>
+        </p:spPr>
+        <p:txBody>
+          <a:bodyPr wrap="square" rtlCol="0">
+            <a:spAutoFit/>
+          </a:bodyPr>
+          <a:lstStyle/>
+          <a:p>
+            <a:r>
+              <a:rPr lang="fr-FR" sz="4400" b="1" dirty="0" err="1" smtClean="0">
+                <a:solidFill>
+                  <a:srgbClr val="FFC000"/>
+                </a:solidFill>
+              </a:rPr>
+              <a:t>conf.min</a:t>
+            </a:r>
+            <a:r>
+              <a:rPr lang="fr-FR" sz="4400" b="1" dirty="0" smtClean="0">
+                <a:solidFill>
+                  <a:srgbClr val="FFC000"/>
+                </a:solidFill>
+              </a:rPr>
+              <a:t> </a:t>
+            </a:r>
+            <a:r>
+              <a:rPr lang="fr-FR" sz="4400" b="1" dirty="0">
+                <a:solidFill>
+                  <a:srgbClr val="FFC000"/>
+                </a:solidFill>
+              </a:rPr>
+              <a:t>= </a:t>
+            </a:r>
+            <a:r>
+              <a:rPr lang="fr-FR" sz="4400" b="1" dirty="0" smtClean="0">
+                <a:solidFill>
+                  <a:srgbClr val="FFC000"/>
+                </a:solidFill>
+              </a:rPr>
+              <a:t>0,75 </a:t>
+            </a:r>
+            <a:endParaRPr lang="en-US" sz="4400" b="1" dirty="0">
+              <a:solidFill>
+                <a:srgbClr val="FFC000"/>
+              </a:solidFill>
+            </a:endParaRPr>
+          </a:p>
+        </p:txBody>
+      </p:sp>
+    </p:spTree>
+    <p:extLst>
+      <p:ext uri="{BB962C8B-B14F-4D97-AF65-F5344CB8AC3E}">
+        <p14:creationId xmlns:p14="http://schemas.microsoft.com/office/powerpoint/2010/main" val="1373115983"/>
+      </p:ext>
+    </p:extLst>
+  </p:cSld>
+  <p:clrMapOvr>
+    <a:masterClrMapping/>
+  </p:clrMapOvr>
+  <p:timing>
+    <p:tnLst>
+      <p:par>
+        <p:cTn id="1" dur="indefinite" restart="never" nodeType="tmRoot"/>
+      </p:par>
+    </p:tnLst>
+  </p:timing>
+</p:sld>
+</file>
+
+<file path=ppt/slides/slide14.xml><?xml version="1.0" encoding="utf-8"?>
+<p:sld xmlns:a="http://schemas.openxmlformats.org/drawingml/2006/main" xmlns:r="http://schemas.openxmlformats.org/officeDocument/2006/relationships" xmlns:p="http://schemas.openxmlformats.org/presentationml/2006/main">
+  <p:cSld>
+    <p:spTree>
+      <p:nvGrpSpPr>
+        <p:cNvPr id="1" name=""/>
+        <p:cNvGrpSpPr/>
+        <p:nvPr/>
+      </p:nvGrpSpPr>
+      <p:grpSpPr>
+        <a:xfrm>
+          <a:off x="0" y="0"/>
+          <a:ext cx="0" cy="0"/>
+          <a:chOff x="0" y="0"/>
+          <a:chExt cx="0" cy="0"/>
+        </a:xfrm>
+      </p:grpSpPr>
+      <p:sp>
+        <p:nvSpPr>
+          <p:cNvPr id="3" name="object 3"/>
+          <p:cNvSpPr/>
+          <p:nvPr/>
+        </p:nvSpPr>
+        <p:spPr>
+          <a:xfrm>
+            <a:off x="0" y="0"/>
+            <a:ext cx="18288000" cy="10287000"/>
+          </a:xfrm>
+          <a:custGeom>
+            <a:avLst/>
+            <a:gdLst/>
+            <a:ahLst/>
+            <a:cxnLst/>
+            <a:rect l="l" t="t" r="r" b="b"/>
+            <a:pathLst>
+              <a:path w="10925810" h="10287000">
+                <a:moveTo>
+                  <a:pt x="0" y="10286999"/>
+                </a:moveTo>
+                <a:lnTo>
+                  <a:pt x="10925328" y="10286999"/>
+                </a:lnTo>
+                <a:lnTo>
+                  <a:pt x="10925328" y="0"/>
+                </a:lnTo>
+                <a:lnTo>
+                  <a:pt x="0" y="0"/>
+                </a:lnTo>
+                <a:lnTo>
+                  <a:pt x="0" y="10286999"/>
+                </a:lnTo>
+                <a:close/>
+              </a:path>
+            </a:pathLst>
+          </a:custGeom>
+          <a:solidFill>
+            <a:srgbClr val="F5EDE7"/>
+          </a:solidFill>
+        </p:spPr>
+        <p:txBody>
+          <a:bodyPr wrap="square" lIns="0" tIns="0" rIns="0" bIns="0" rtlCol="0"/>
+          <a:lstStyle/>
+          <a:p>
+            <a:endParaRPr/>
+          </a:p>
+        </p:txBody>
+      </p:sp>
+      <p:sp>
+        <p:nvSpPr>
+          <p:cNvPr id="11" name="object 6"/>
+          <p:cNvSpPr/>
+          <p:nvPr/>
+        </p:nvSpPr>
+        <p:spPr>
+          <a:xfrm>
+            <a:off x="2289944" y="13117"/>
+            <a:ext cx="13178656" cy="1105544"/>
+          </a:xfrm>
+          <a:custGeom>
+            <a:avLst/>
+            <a:gdLst/>
+            <a:ahLst/>
+            <a:cxnLst/>
+            <a:rect l="l" t="t" r="r" b="b"/>
+            <a:pathLst>
+              <a:path w="5067300" h="4762500">
+                <a:moveTo>
+                  <a:pt x="0" y="0"/>
+                </a:moveTo>
+                <a:lnTo>
+                  <a:pt x="5067299" y="0"/>
+                </a:lnTo>
+                <a:lnTo>
+                  <a:pt x="5067299" y="4762499"/>
+                </a:lnTo>
+                <a:lnTo>
+                  <a:pt x="0" y="4762499"/>
+                </a:lnTo>
+                <a:lnTo>
+                  <a:pt x="0" y="0"/>
+                </a:lnTo>
+                <a:close/>
+              </a:path>
+            </a:pathLst>
+          </a:custGeom>
+          <a:solidFill>
+            <a:srgbClr val="D5B9AE"/>
+          </a:solidFill>
+        </p:spPr>
+        <p:txBody>
+          <a:bodyPr wrap="square" lIns="0" tIns="0" rIns="0" bIns="0" rtlCol="0"/>
+          <a:lstStyle/>
+          <a:p>
+            <a:pPr marL="12700">
+              <a:lnSpc>
+                <a:spcPct val="100000"/>
+              </a:lnSpc>
+              <a:spcBef>
+                <a:spcPts val="5"/>
+              </a:spcBef>
+              <a:tabLst>
+                <a:tab pos="1899285" algn="l"/>
+              </a:tabLst>
+            </a:pPr>
+            <a:endParaRPr lang="en-US" dirty="0">
+              <a:latin typeface="Palatino Linotype"/>
+              <a:cs typeface="Palatino Linotype"/>
+            </a:endParaRPr>
+          </a:p>
+        </p:txBody>
+      </p:sp>
+      <p:sp>
+        <p:nvSpPr>
+          <p:cNvPr id="12" name="ZoneTexte 11"/>
+          <p:cNvSpPr txBox="1"/>
+          <p:nvPr/>
+        </p:nvSpPr>
+        <p:spPr>
+          <a:xfrm>
+            <a:off x="5943600" y="68734"/>
+            <a:ext cx="4310530" cy="769441"/>
+          </a:xfrm>
+          <a:prstGeom prst="rect">
+            <a:avLst/>
+          </a:prstGeom>
+          <a:noFill/>
+        </p:spPr>
+        <p:txBody>
+          <a:bodyPr wrap="square" rtlCol="0">
+            <a:spAutoFit/>
+          </a:bodyPr>
+          <a:lstStyle/>
+          <a:p>
+            <a:r>
+              <a:rPr lang="en-US" sz="4400" b="1" dirty="0" smtClean="0"/>
+              <a:t>EXEMPLE (Suite)</a:t>
+            </a:r>
+            <a:endParaRPr lang="en-US" sz="4400" b="1" dirty="0"/>
+          </a:p>
+        </p:txBody>
+      </p:sp>
+      <p:pic>
+        <p:nvPicPr>
+          <p:cNvPr id="15" name="Image 14"/>
+          <p:cNvPicPr>
+            <a:picLocks noChangeAspect="1"/>
+          </p:cNvPicPr>
+          <p:nvPr/>
+        </p:nvPicPr>
+        <p:blipFill>
+          <a:blip r:embed="rId3" cstate="print">
+            <a:extLst>
+              <a:ext uri="{28A0092B-C50C-407E-A947-70E740481C1C}">
+                <a14:useLocalDpi xmlns:a14="http://schemas.microsoft.com/office/drawing/2010/main" val="0"/>
+              </a:ext>
+            </a:extLst>
+          </a:blip>
+          <a:stretch>
+            <a:fillRect/>
+          </a:stretch>
+        </p:blipFill>
+        <p:spPr>
+          <a:xfrm>
+            <a:off x="10289107" y="152749"/>
+            <a:ext cx="1488760" cy="701041"/>
+          </a:xfrm>
+          <a:prstGeom prst="rect">
+            <a:avLst/>
+          </a:prstGeom>
+        </p:spPr>
+      </p:pic>
+      <p:sp>
+        <p:nvSpPr>
+          <p:cNvPr id="114" name="ZoneTexte 113"/>
+          <p:cNvSpPr txBox="1"/>
+          <p:nvPr/>
+        </p:nvSpPr>
+        <p:spPr>
+          <a:xfrm>
+            <a:off x="5715000" y="1333500"/>
+            <a:ext cx="6594391" cy="584775"/>
+          </a:xfrm>
+          <a:prstGeom prst="rect">
+            <a:avLst/>
+          </a:prstGeom>
+          <a:noFill/>
+        </p:spPr>
+        <p:txBody>
+          <a:bodyPr wrap="square" rtlCol="0">
+            <a:spAutoFit/>
+          </a:bodyPr>
+          <a:lstStyle/>
+          <a:p>
+            <a:r>
+              <a:rPr lang="fr-FR" sz="3200" b="1" i="1" dirty="0" smtClean="0">
+                <a:solidFill>
+                  <a:srgbClr val="C00000"/>
+                </a:solidFill>
+              </a:rPr>
+              <a:t>Extraction des </a:t>
+            </a:r>
+            <a:r>
+              <a:rPr lang="fr-FR" sz="3200" b="1" i="1" dirty="0" err="1" smtClean="0">
+                <a:solidFill>
+                  <a:srgbClr val="C00000"/>
+                </a:solidFill>
+              </a:rPr>
+              <a:t>Regles</a:t>
+            </a:r>
+            <a:r>
+              <a:rPr lang="fr-FR" sz="3200" b="1" i="1" dirty="0" smtClean="0">
+                <a:solidFill>
+                  <a:srgbClr val="C00000"/>
+                </a:solidFill>
+              </a:rPr>
+              <a:t> d`association</a:t>
+            </a:r>
+            <a:endParaRPr lang="en-US" sz="3200" b="1" i="1" dirty="0">
+              <a:solidFill>
+                <a:srgbClr val="C00000"/>
+              </a:solidFill>
+            </a:endParaRPr>
+          </a:p>
+        </p:txBody>
+      </p:sp>
+      <p:sp>
+        <p:nvSpPr>
+          <p:cNvPr id="24" name="ZoneTexte 23"/>
+          <p:cNvSpPr txBox="1"/>
+          <p:nvPr/>
+        </p:nvSpPr>
+        <p:spPr>
+          <a:xfrm>
+            <a:off x="211577" y="4519348"/>
+            <a:ext cx="4541847" cy="769441"/>
+          </a:xfrm>
+          <a:prstGeom prst="rect">
+            <a:avLst/>
+          </a:prstGeom>
+          <a:noFill/>
+        </p:spPr>
+        <p:txBody>
+          <a:bodyPr wrap="square" rtlCol="0">
+            <a:spAutoFit/>
+          </a:bodyPr>
+          <a:lstStyle/>
+          <a:p>
+            <a:r>
+              <a:rPr lang="fr-FR" sz="4400" b="1" dirty="0" err="1" smtClean="0">
+                <a:solidFill>
+                  <a:srgbClr val="FFC000"/>
+                </a:solidFill>
+              </a:rPr>
+              <a:t>conf.min</a:t>
+            </a:r>
+            <a:r>
+              <a:rPr lang="fr-FR" sz="4400" b="1" dirty="0" smtClean="0">
+                <a:solidFill>
+                  <a:srgbClr val="FFC000"/>
+                </a:solidFill>
+              </a:rPr>
+              <a:t> </a:t>
+            </a:r>
+            <a:r>
+              <a:rPr lang="fr-FR" sz="4400" b="1" dirty="0">
+                <a:solidFill>
+                  <a:srgbClr val="FFC000"/>
+                </a:solidFill>
+              </a:rPr>
+              <a:t>= </a:t>
+            </a:r>
+            <a:r>
+              <a:rPr lang="fr-FR" sz="4400" b="1" dirty="0" smtClean="0">
+                <a:solidFill>
+                  <a:srgbClr val="FFC000"/>
+                </a:solidFill>
+              </a:rPr>
+              <a:t>0,75 </a:t>
+            </a:r>
+            <a:endParaRPr lang="en-US" sz="4400" b="1" dirty="0">
+              <a:solidFill>
+                <a:srgbClr val="FFC000"/>
+              </a:solidFill>
+            </a:endParaRPr>
+          </a:p>
+        </p:txBody>
+      </p:sp>
+      <p:sp>
+        <p:nvSpPr>
+          <p:cNvPr id="32" name="ZoneTexte 31"/>
+          <p:cNvSpPr txBox="1"/>
+          <p:nvPr/>
+        </p:nvSpPr>
+        <p:spPr>
+          <a:xfrm>
+            <a:off x="3313" y="6430780"/>
+            <a:ext cx="18132287" cy="646331"/>
+          </a:xfrm>
+          <a:prstGeom prst="rect">
+            <a:avLst/>
+          </a:prstGeom>
+          <a:noFill/>
+        </p:spPr>
+        <p:txBody>
+          <a:bodyPr wrap="square" rtlCol="0">
+            <a:spAutoFit/>
+          </a:bodyPr>
+          <a:lstStyle/>
+          <a:p>
+            <a:r>
+              <a:rPr lang="en-US" sz="3600" b="1" dirty="0" smtClean="0"/>
+              <a:t>  {p2,p3</a:t>
+            </a:r>
+            <a:r>
+              <a:rPr lang="en-US" sz="3600" b="1" dirty="0" smtClean="0"/>
+              <a:t>} </a:t>
+            </a:r>
+            <a:r>
+              <a:rPr lang="en-US" sz="3600" b="1" dirty="0"/>
+              <a:t>-&gt; </a:t>
+            </a:r>
+            <a:r>
+              <a:rPr lang="en-US" sz="3600" b="1" dirty="0" smtClean="0"/>
+              <a:t>{p1}</a:t>
+            </a:r>
+            <a:r>
+              <a:rPr lang="en-US" sz="3600" b="1" dirty="0" smtClean="0">
+                <a:solidFill>
+                  <a:srgbClr val="00B050"/>
+                </a:solidFill>
+              </a:rPr>
+              <a:t> </a:t>
+            </a:r>
+            <a:r>
+              <a:rPr lang="en-US" sz="3600" b="1" dirty="0" smtClean="0"/>
+              <a:t> (</a:t>
+            </a:r>
+            <a:r>
+              <a:rPr lang="en-US" sz="3600" b="1" dirty="0" smtClean="0">
+                <a:solidFill>
+                  <a:srgbClr val="FFC000"/>
+                </a:solidFill>
+              </a:rPr>
+              <a:t>2</a:t>
+            </a:r>
+            <a:r>
+              <a:rPr lang="en-US" sz="3600" b="1" dirty="0" smtClean="0"/>
+              <a:t>/3 </a:t>
+            </a:r>
+            <a:r>
+              <a:rPr lang="en-US" sz="3600" b="1" dirty="0" err="1" smtClean="0">
+                <a:solidFill>
+                  <a:srgbClr val="FF0000"/>
+                </a:solidFill>
+              </a:rPr>
+              <a:t>Refusé</a:t>
+            </a:r>
+            <a:r>
+              <a:rPr lang="en-US" sz="3600" b="1" dirty="0" smtClean="0"/>
+              <a:t>)     {p1,p3</a:t>
+            </a:r>
+            <a:r>
+              <a:rPr lang="en-US" sz="3600" b="1" dirty="0"/>
+              <a:t>} -&gt; </a:t>
+            </a:r>
+            <a:r>
+              <a:rPr lang="en-US" sz="3600" b="1" dirty="0" smtClean="0"/>
+              <a:t>{p2} </a:t>
+            </a:r>
+            <a:r>
+              <a:rPr lang="en-US" sz="3600" b="1" dirty="0"/>
+              <a:t>(</a:t>
+            </a:r>
+            <a:r>
+              <a:rPr lang="en-US" sz="3600" b="1" dirty="0" smtClean="0">
+                <a:solidFill>
+                  <a:schemeClr val="accent6"/>
+                </a:solidFill>
+              </a:rPr>
+              <a:t>2</a:t>
+            </a:r>
+            <a:r>
+              <a:rPr lang="en-US" sz="3600" b="1" dirty="0" smtClean="0"/>
+              <a:t>/4 </a:t>
+            </a:r>
+            <a:r>
+              <a:rPr lang="en-US" sz="3600" b="1" dirty="0" err="1">
+                <a:solidFill>
+                  <a:srgbClr val="FF0000"/>
+                </a:solidFill>
+              </a:rPr>
+              <a:t>Refusé</a:t>
+            </a:r>
+            <a:r>
+              <a:rPr lang="en-US" sz="3600" b="1" dirty="0"/>
+              <a:t>)</a:t>
+            </a:r>
+            <a:r>
+              <a:rPr lang="en-US" sz="3600" b="1" dirty="0" smtClean="0"/>
+              <a:t>        </a:t>
+            </a:r>
+            <a:r>
+              <a:rPr lang="en-US" sz="3600" b="1" dirty="0" smtClean="0"/>
+              <a:t>{p1,p2}  </a:t>
+            </a:r>
+            <a:r>
+              <a:rPr lang="en-US" sz="3600" b="1" dirty="0" smtClean="0"/>
+              <a:t>-&gt; {p3} </a:t>
+            </a:r>
+            <a:r>
+              <a:rPr lang="en-US" sz="3600" b="1" dirty="0"/>
+              <a:t>(</a:t>
+            </a:r>
+            <a:r>
+              <a:rPr lang="en-US" sz="3600" b="1" dirty="0" smtClean="0">
+                <a:solidFill>
+                  <a:srgbClr val="FFC000"/>
+                </a:solidFill>
+              </a:rPr>
+              <a:t>2</a:t>
+            </a:r>
+            <a:r>
+              <a:rPr lang="en-US" sz="3600" b="1" dirty="0" smtClean="0"/>
+              <a:t>/2 </a:t>
+            </a:r>
+            <a:r>
+              <a:rPr lang="en-US" sz="3600" b="1" dirty="0" err="1" smtClean="0">
+                <a:solidFill>
+                  <a:srgbClr val="00B050"/>
+                </a:solidFill>
+              </a:rPr>
+              <a:t>Accepté</a:t>
+            </a:r>
+            <a:r>
+              <a:rPr lang="en-US" sz="3600" b="1" dirty="0"/>
+              <a:t>)</a:t>
+            </a:r>
+            <a:r>
+              <a:rPr lang="en-US" sz="3600" b="1" dirty="0" smtClean="0"/>
+              <a:t>        </a:t>
+            </a:r>
+            <a:endParaRPr lang="en-US" sz="3600" b="1" dirty="0"/>
+          </a:p>
+        </p:txBody>
+      </p:sp>
+      <p:sp>
+        <p:nvSpPr>
+          <p:cNvPr id="34" name="ZoneTexte 33"/>
+          <p:cNvSpPr txBox="1"/>
+          <p:nvPr/>
+        </p:nvSpPr>
+        <p:spPr>
+          <a:xfrm>
+            <a:off x="7738590" y="4169660"/>
+            <a:ext cx="3284011" cy="734409"/>
+          </a:xfrm>
+          <a:prstGeom prst="rect">
+            <a:avLst/>
+          </a:prstGeom>
+          <a:noFill/>
+        </p:spPr>
+        <p:txBody>
+          <a:bodyPr wrap="square" rtlCol="0">
+            <a:spAutoFit/>
+          </a:bodyPr>
+          <a:lstStyle/>
+          <a:p>
+            <a:r>
               <a:rPr lang="en-US" sz="4000" b="1" dirty="0" smtClean="0"/>
               <a:t>{p1,p2,p3}               </a:t>
             </a:r>
@@ -11721,14 +13551,202 @@
       </p:sp>
       <p:cxnSp>
         <p:nvCxnSpPr>
-          <p:cNvPr id="22" name="Connecteur droit 21"/>
+          <p:cNvPr id="46" name="Connecteur droit 45"/>
           <p:cNvCxnSpPr/>
           <p:nvPr/>
         </p:nvCxnSpPr>
         <p:spPr>
+          <a:xfrm>
+            <a:off x="9012196" y="4840517"/>
+            <a:ext cx="55604" cy="1445983"/>
+          </a:xfrm>
+          <a:prstGeom prst="line">
+            <a:avLst/>
+          </a:prstGeom>
+        </p:spPr>
+        <p:style>
+          <a:lnRef idx="3">
+            <a:schemeClr val="accent2"/>
+          </a:lnRef>
+          <a:fillRef idx="0">
+            <a:schemeClr val="accent2"/>
+          </a:fillRef>
+          <a:effectRef idx="2">
+            <a:schemeClr val="accent2"/>
+          </a:effectRef>
+          <a:fontRef idx="minor">
+            <a:schemeClr val="tx1"/>
+          </a:fontRef>
+        </p:style>
+      </p:cxnSp>
+      <p:sp>
+        <p:nvSpPr>
+          <p:cNvPr id="51" name="ZoneTexte 50"/>
+          <p:cNvSpPr txBox="1"/>
+          <p:nvPr/>
+        </p:nvSpPr>
+        <p:spPr>
           <a:xfrm flipH="1">
-            <a:off x="3467100" y="5844629"/>
-            <a:ext cx="1485900" cy="838824"/>
+            <a:off x="8576182" y="3467100"/>
+            <a:ext cx="629986" cy="830997"/>
+          </a:xfrm>
+          <a:prstGeom prst="rect">
+            <a:avLst/>
+          </a:prstGeom>
+          <a:noFill/>
+        </p:spPr>
+        <p:txBody>
+          <a:bodyPr wrap="square" rtlCol="0">
+            <a:spAutoFit/>
+          </a:bodyPr>
+          <a:lstStyle/>
+          <a:p>
+            <a:r>
+              <a:rPr lang="en-US" sz="4800" b="1" dirty="0">
+                <a:solidFill>
+                  <a:srgbClr val="00B050"/>
+                </a:solidFill>
+              </a:rPr>
+              <a:t>2</a:t>
+            </a:r>
+            <a:r>
+              <a:rPr lang="en-US" sz="4800" b="1" dirty="0" smtClean="0">
+                <a:solidFill>
+                  <a:srgbClr val="00B050"/>
+                </a:solidFill>
+              </a:rPr>
+              <a:t>                                                       </a:t>
+            </a:r>
+            <a:endParaRPr lang="en-US" sz="4800" b="1" dirty="0">
+              <a:solidFill>
+                <a:srgbClr val="00B050"/>
+              </a:solidFill>
+            </a:endParaRPr>
+          </a:p>
+        </p:txBody>
+      </p:sp>
+      <p:sp>
+        <p:nvSpPr>
+          <p:cNvPr id="57" name="ZoneTexte 56"/>
+          <p:cNvSpPr txBox="1"/>
+          <p:nvPr/>
+        </p:nvSpPr>
+        <p:spPr>
+          <a:xfrm>
+            <a:off x="577154" y="2038602"/>
+            <a:ext cx="10624246" cy="584775"/>
+          </a:xfrm>
+          <a:prstGeom prst="rect">
+            <a:avLst/>
+          </a:prstGeom>
+          <a:noFill/>
+        </p:spPr>
+        <p:txBody>
+          <a:bodyPr wrap="square" rtlCol="0">
+            <a:spAutoFit/>
+          </a:bodyPr>
+          <a:lstStyle/>
+          <a:p>
+            <a:r>
+              <a:rPr lang="fr-FR" sz="3200" b="1" dirty="0">
+                <a:solidFill>
+                  <a:schemeClr val="accent6">
+                    <a:lumMod val="75000"/>
+                  </a:schemeClr>
+                </a:solidFill>
+              </a:rPr>
+              <a:t>2</a:t>
+            </a:r>
+            <a:r>
+              <a:rPr lang="fr-FR" sz="3200" b="1" dirty="0" smtClean="0">
+                <a:solidFill>
+                  <a:schemeClr val="accent6">
+                    <a:lumMod val="75000"/>
+                  </a:schemeClr>
+                </a:solidFill>
+              </a:rPr>
+              <a:t>. Recherche </a:t>
+            </a:r>
+            <a:r>
+              <a:rPr lang="fr-FR" sz="3200" b="1" dirty="0">
+                <a:solidFill>
+                  <a:schemeClr val="accent6">
+                    <a:lumMod val="75000"/>
+                  </a:schemeClr>
+                </a:solidFill>
+              </a:rPr>
+              <a:t>des règles pour les </a:t>
+            </a:r>
+            <a:r>
+              <a:rPr lang="fr-FR" sz="3200" b="1" dirty="0" err="1">
+                <a:solidFill>
+                  <a:schemeClr val="accent6">
+                    <a:lumMod val="75000"/>
+                  </a:schemeClr>
+                </a:solidFill>
+              </a:rPr>
+              <a:t>itemsets</a:t>
+            </a:r>
+            <a:r>
+              <a:rPr lang="fr-FR" sz="3200" b="1" dirty="0">
+                <a:solidFill>
+                  <a:schemeClr val="accent6">
+                    <a:lumMod val="75000"/>
+                  </a:schemeClr>
+                </a:solidFill>
+              </a:rPr>
+              <a:t> de </a:t>
+            </a:r>
+            <a:r>
+              <a:rPr lang="fr-FR" sz="3200" b="1" dirty="0" err="1">
+                <a:solidFill>
+                  <a:schemeClr val="accent6">
+                    <a:lumMod val="75000"/>
+                  </a:schemeClr>
+                </a:solidFill>
+              </a:rPr>
+              <a:t>card</a:t>
+            </a:r>
+            <a:r>
+              <a:rPr lang="fr-FR" sz="3200" b="1" dirty="0">
+                <a:solidFill>
+                  <a:schemeClr val="accent6">
+                    <a:lumMod val="75000"/>
+                  </a:schemeClr>
+                </a:solidFill>
+              </a:rPr>
+              <a:t> = </a:t>
+            </a:r>
+            <a:r>
+              <a:rPr lang="fr-FR" sz="3200" b="1" dirty="0" smtClean="0">
+                <a:solidFill>
+                  <a:schemeClr val="accent6">
+                    <a:lumMod val="75000"/>
+                  </a:schemeClr>
+                </a:solidFill>
+              </a:rPr>
+              <a:t>3 ou plus</a:t>
+            </a:r>
+            <a:endParaRPr lang="en-US" sz="3200" b="1" dirty="0">
+              <a:solidFill>
+                <a:schemeClr val="accent6">
+                  <a:lumMod val="75000"/>
+                </a:schemeClr>
+              </a:solidFill>
+            </a:endParaRPr>
+          </a:p>
+        </p:txBody>
+      </p:sp>
+      <p:cxnSp>
+        <p:nvCxnSpPr>
+          <p:cNvPr id="58" name="Connecteur droit 57"/>
+          <p:cNvCxnSpPr/>
+          <p:nvPr/>
+        </p:nvCxnSpPr>
+        <p:spPr>
+          <a:xfrm flipH="1">
+            <a:off x="3505200" y="4746557"/>
+            <a:ext cx="5036187" cy="1684223"/>
           </a:xfrm>
           <a:prstGeom prst="line">
             <a:avLst/>
@@ -11751,14 +13769,84 @@
       </p:cxnSp>
       <p:cxnSp>
         <p:nvCxnSpPr>
-          <p:cNvPr id="23" name="Connecteur droit 22"/>
+          <p:cNvPr id="60" name="Connecteur droit 59"/>
           <p:cNvCxnSpPr/>
           <p:nvPr/>
         </p:nvCxnSpPr>
         <p:spPr>
           <a:xfrm>
-            <a:off x="5486400" y="5862490"/>
-            <a:ext cx="304800" cy="966838"/>
+            <a:off x="9564086" y="4675003"/>
+            <a:ext cx="6895114" cy="1913289"/>
+          </a:xfrm>
+          <a:prstGeom prst="line">
+            <a:avLst/>
+          </a:prstGeom>
+        </p:spPr>
+        <p:style>
+          <a:lnRef idx="3">
+            <a:schemeClr val="accent2"/>
+          </a:lnRef>
+          <a:fillRef idx="0">
+            <a:schemeClr val="accent2"/>
+          </a:fillRef>
+          <a:effectRef idx="2">
+            <a:schemeClr val="accent2"/>
+          </a:effectRef>
+          <a:fontRef idx="minor">
+            <a:schemeClr val="tx1"/>
+          </a:fontRef>
+        </p:style>
+      </p:cxnSp>
+      <p:sp>
+        <p:nvSpPr>
+          <p:cNvPr id="61" name="Accolade ouvrante 60"/>
+          <p:cNvSpPr/>
+          <p:nvPr/>
+        </p:nvSpPr>
+        <p:spPr>
+          <a:xfrm rot="16200000">
+            <a:off x="5363348" y="1837550"/>
+            <a:ext cx="931902" cy="11049001"/>
+          </a:xfrm>
+          <a:prstGeom prst="leftBrace">
+            <a:avLst/>
+          </a:prstGeom>
+        </p:spPr>
+        <p:style>
+          <a:lnRef idx="3">
+            <a:schemeClr val="accent2"/>
+          </a:lnRef>
+          <a:fillRef idx="0">
+            <a:schemeClr val="accent2"/>
+          </a:fillRef>
+          <a:effectRef idx="2">
+            <a:schemeClr val="accent2"/>
+          </a:effectRef>
+          <a:fontRef idx="minor">
+            <a:schemeClr val="tx1"/>
+          </a:fontRef>
+        </p:style>
+        <p:txBody>
+          <a:bodyPr rtlCol="0" anchor="ctr"/>
+          <a:lstStyle/>
+          <a:p>
+            <a:pPr algn="ctr"/>
+            <a:endParaRPr lang="en-US"/>
+          </a:p>
+        </p:txBody>
+      </p:sp>
+      <p:cxnSp>
+        <p:nvCxnSpPr>
+          <p:cNvPr id="68" name="Connecteur droit 67"/>
+          <p:cNvCxnSpPr>
+            <a:endCxn id="64" idx="0"/>
+          </p:cNvCxnSpPr>
+          <p:nvPr/>
+        </p:nvCxnSpPr>
+        <p:spPr>
+          <a:xfrm flipH="1">
+            <a:off x="12894367" y="6898086"/>
+            <a:ext cx="897833" cy="1464685"/>
           </a:xfrm>
           <a:prstGeom prst="line">
             <a:avLst/>
@@ -11781,284 +13869,14 @@
       </p:cxnSp>
       <p:cxnSp>
         <p:nvCxnSpPr>
-          <p:cNvPr id="26" name="Connecteur droit 25"/>
+          <p:cNvPr id="70" name="Connecteur droit 69"/>
           <p:cNvCxnSpPr/>
           <p:nvPr/>
         </p:nvCxnSpPr>
         <p:spPr>
           <a:xfrm>
-            <a:off x="5791200" y="5718416"/>
-            <a:ext cx="2667000" cy="1110912"/>
-          </a:xfrm>
-          <a:prstGeom prst="line">
-            <a:avLst/>
-          </a:prstGeom>
-        </p:spPr>
-        <p:style>
-          <a:lnRef idx="3">
-            <a:schemeClr val="accent2"/>
-          </a:lnRef>
-          <a:fillRef idx="0">
-            <a:schemeClr val="accent2"/>
-          </a:fillRef>
-          <a:effectRef idx="2">
-            <a:schemeClr val="accent2"/>
-          </a:effectRef>
-          <a:fontRef idx="minor">
-            <a:schemeClr val="tx1"/>
-          </a:fontRef>
-        </p:style>
-      </p:cxnSp>
-      <p:cxnSp>
-        <p:nvCxnSpPr>
-          <p:cNvPr id="29" name="Connecteur droit 28"/>
-          <p:cNvCxnSpPr/>
-          <p:nvPr/>
-        </p:nvCxnSpPr>
-        <p:spPr>
-          <a:xfrm flipV="1">
-            <a:off x="5749023" y="3797223"/>
-            <a:ext cx="3527629" cy="1339520"/>
-          </a:xfrm>
-          <a:prstGeom prst="line">
-            <a:avLst/>
-          </a:prstGeom>
-        </p:spPr>
-        <p:style>
-          <a:lnRef idx="3">
-            <a:schemeClr val="accent2"/>
-          </a:lnRef>
-          <a:fillRef idx="0">
-            <a:schemeClr val="accent2"/>
-          </a:fillRef>
-          <a:effectRef idx="2">
-            <a:schemeClr val="accent2"/>
-          </a:effectRef>
-          <a:fontRef idx="minor">
-            <a:schemeClr val="tx1"/>
-          </a:fontRef>
-        </p:style>
-      </p:cxnSp>
-      <p:cxnSp>
-        <p:nvCxnSpPr>
-          <p:cNvPr id="33" name="Connecteur droit 32"/>
-          <p:cNvCxnSpPr/>
-          <p:nvPr/>
-        </p:nvCxnSpPr>
-        <p:spPr>
-          <a:xfrm flipV="1">
-            <a:off x="8686800" y="4220713"/>
-            <a:ext cx="1114984" cy="929395"/>
-          </a:xfrm>
-          <a:prstGeom prst="line">
-            <a:avLst/>
-          </a:prstGeom>
-        </p:spPr>
-        <p:style>
-          <a:lnRef idx="3">
-            <a:schemeClr val="accent2"/>
-          </a:lnRef>
-          <a:fillRef idx="0">
-            <a:schemeClr val="accent2"/>
-          </a:fillRef>
-          <a:effectRef idx="2">
-            <a:schemeClr val="accent2"/>
-          </a:effectRef>
-          <a:fontRef idx="minor">
-            <a:schemeClr val="tx1"/>
-          </a:fontRef>
-        </p:style>
-      </p:cxnSp>
-      <p:cxnSp>
-        <p:nvCxnSpPr>
-          <p:cNvPr id="35" name="Connecteur droit 34"/>
-          <p:cNvCxnSpPr/>
-          <p:nvPr/>
-        </p:nvCxnSpPr>
-        <p:spPr>
-          <a:xfrm flipH="1" flipV="1">
-            <a:off x="10322208" y="4256430"/>
-            <a:ext cx="804964" cy="891063"/>
-          </a:xfrm>
-          <a:prstGeom prst="line">
-            <a:avLst/>
-          </a:prstGeom>
-        </p:spPr>
-        <p:style>
-          <a:lnRef idx="3">
-            <a:schemeClr val="accent2"/>
-          </a:lnRef>
-          <a:fillRef idx="0">
-            <a:schemeClr val="accent2"/>
-          </a:fillRef>
-          <a:effectRef idx="2">
-            <a:schemeClr val="accent2"/>
-          </a:effectRef>
-          <a:fontRef idx="minor">
-            <a:schemeClr val="tx1"/>
-          </a:fontRef>
-        </p:style>
-      </p:cxnSp>
-      <p:cxnSp>
-        <p:nvCxnSpPr>
-          <p:cNvPr id="45" name="Connecteur droit 44"/>
-          <p:cNvCxnSpPr/>
-          <p:nvPr/>
-        </p:nvCxnSpPr>
-        <p:spPr>
-          <a:xfrm flipV="1">
-            <a:off x="3737744" y="5699415"/>
-            <a:ext cx="4872856" cy="1146165"/>
-          </a:xfrm>
-          <a:prstGeom prst="line">
-            <a:avLst/>
-          </a:prstGeom>
-        </p:spPr>
-        <p:style>
-          <a:lnRef idx="3">
-            <a:schemeClr val="accent2"/>
-          </a:lnRef>
-          <a:fillRef idx="0">
-            <a:schemeClr val="accent2"/>
-          </a:fillRef>
-          <a:effectRef idx="2">
-            <a:schemeClr val="accent2"/>
-          </a:effectRef>
-          <a:fontRef idx="minor">
-            <a:schemeClr val="tx1"/>
-          </a:fontRef>
-        </p:style>
-      </p:cxnSp>
-      <p:cxnSp>
-        <p:nvCxnSpPr>
-          <p:cNvPr id="47" name="Connecteur droit 46"/>
-          <p:cNvCxnSpPr/>
-          <p:nvPr/>
-        </p:nvCxnSpPr>
-        <p:spPr>
-          <a:xfrm flipH="1" flipV="1">
-            <a:off x="8745922" y="5718416"/>
-            <a:ext cx="2684078" cy="1140530"/>
-          </a:xfrm>
-          <a:prstGeom prst="line">
-            <a:avLst/>
-          </a:prstGeom>
-        </p:spPr>
-        <p:style>
-          <a:lnRef idx="3">
-            <a:schemeClr val="accent2"/>
-          </a:lnRef>
-          <a:fillRef idx="0">
-            <a:schemeClr val="accent2"/>
-          </a:fillRef>
-          <a:effectRef idx="2">
-            <a:schemeClr val="accent2"/>
-          </a:effectRef>
-          <a:fontRef idx="minor">
-            <a:schemeClr val="tx1"/>
-          </a:fontRef>
-        </p:style>
-      </p:cxnSp>
-      <p:cxnSp>
-        <p:nvCxnSpPr>
-          <p:cNvPr id="54" name="Connecteur droit 53"/>
-          <p:cNvCxnSpPr/>
-          <p:nvPr/>
-        </p:nvCxnSpPr>
-        <p:spPr>
-          <a:xfrm flipV="1">
-            <a:off x="6096000" y="5669797"/>
-            <a:ext cx="4628690" cy="1186533"/>
-          </a:xfrm>
-          <a:prstGeom prst="line">
-            <a:avLst/>
-          </a:prstGeom>
-        </p:spPr>
-        <p:style>
-          <a:lnRef idx="3">
-            <a:schemeClr val="accent2"/>
-          </a:lnRef>
-          <a:fillRef idx="0">
-            <a:schemeClr val="accent2"/>
-          </a:fillRef>
-          <a:effectRef idx="2">
-            <a:schemeClr val="accent2"/>
-          </a:effectRef>
-          <a:fontRef idx="minor">
-            <a:schemeClr val="tx1"/>
-          </a:fontRef>
-        </p:style>
-      </p:cxnSp>
-      <p:cxnSp>
-        <p:nvCxnSpPr>
-          <p:cNvPr id="59" name="Connecteur droit 58"/>
-          <p:cNvCxnSpPr/>
-          <p:nvPr/>
-        </p:nvCxnSpPr>
-        <p:spPr>
-          <a:xfrm flipH="1" flipV="1">
-            <a:off x="11260522" y="5747061"/>
-            <a:ext cx="533400" cy="1077290"/>
-          </a:xfrm>
-          <a:prstGeom prst="line">
-            <a:avLst/>
-          </a:prstGeom>
-        </p:spPr>
-        <p:style>
-          <a:lnRef idx="3">
-            <a:schemeClr val="accent2"/>
-          </a:lnRef>
-          <a:fillRef idx="0">
-            <a:schemeClr val="accent2"/>
-          </a:fillRef>
-          <a:effectRef idx="2">
-            <a:schemeClr val="accent2"/>
-          </a:effectRef>
-          <a:fontRef idx="minor">
-            <a:schemeClr val="tx1"/>
-          </a:fontRef>
-        </p:style>
-      </p:cxnSp>
-      <p:cxnSp>
-        <p:nvCxnSpPr>
-          <p:cNvPr id="71" name="Connecteur droit 70"/>
-          <p:cNvCxnSpPr/>
-          <p:nvPr/>
-        </p:nvCxnSpPr>
-        <p:spPr>
-          <a:xfrm>
-            <a:off x="3055866" y="7176120"/>
-            <a:ext cx="1290484" cy="1456120"/>
-          </a:xfrm>
-          <a:prstGeom prst="line">
-            <a:avLst/>
-          </a:prstGeom>
-        </p:spPr>
-        <p:style>
-          <a:lnRef idx="3">
-            <a:schemeClr val="accent2"/>
-          </a:lnRef>
-          <a:fillRef idx="0">
-            <a:schemeClr val="accent2"/>
-          </a:fillRef>
-          <a:effectRef idx="2">
-            <a:schemeClr val="accent2"/>
-          </a:effectRef>
-          <a:fontRef idx="minor">
-            <a:schemeClr val="tx1"/>
-          </a:fontRef>
-        </p:style>
-      </p:cxnSp>
-      <p:cxnSp>
-        <p:nvCxnSpPr>
-          <p:cNvPr id="77" name="Connecteur droit 76"/>
-          <p:cNvCxnSpPr/>
-          <p:nvPr/>
-        </p:nvCxnSpPr>
-        <p:spPr>
-          <a:xfrm flipH="1">
-            <a:off x="5081392" y="7184149"/>
-            <a:ext cx="557410" cy="1465578"/>
+            <a:off x="15240000" y="6974795"/>
+            <a:ext cx="1371600" cy="1369274"/>
           </a:xfrm>
           <a:prstGeom prst="line">
             <a:avLst/>
@@ -12081,14 +13899,14 @@
       </p:cxnSp>
       <p:sp>
         <p:nvSpPr>
-          <p:cNvPr id="110" name="ZoneTexte 109"/>
+          <p:cNvPr id="64" name="ZoneTexte 63"/>
           <p:cNvSpPr txBox="1"/>
           <p:nvPr/>
         </p:nvSpPr>
         <p:spPr>
           <a:xfrm>
-            <a:off x="4935167" y="4522409"/>
-            <a:ext cx="6766764" cy="830997"/>
+            <a:off x="11353800" y="8362771"/>
+            <a:ext cx="3081133" cy="1200329"/>
           </a:xfrm>
           <a:prstGeom prst="rect">
             <a:avLst/>
@@ -12102,31 +13920,65 @@
           <a:lstStyle/>
           <a:p>
             <a:r>
-              <a:rPr lang="en-US" sz="4800" b="1" dirty="0" smtClean="0">
+              <a:rPr lang="en-US" sz="3600" b="1" dirty="0"/>
+              <a:t>{</a:t>
+            </a:r>
+            <a:r>
+              <a:rPr lang="en-US" sz="3600" b="1" dirty="0" smtClean="0"/>
+              <a:t>p1}  </a:t>
+            </a:r>
+            <a:r>
+              <a:rPr lang="en-US" sz="3600" b="1" dirty="0"/>
+              <a:t>-&gt; {</a:t>
+            </a:r>
+            <a:r>
+              <a:rPr lang="en-US" sz="3600" b="1" dirty="0" smtClean="0"/>
+              <a:t>p2,p3}</a:t>
+            </a:r>
+          </a:p>
+          <a:p>
+            <a:r>
+              <a:rPr lang="en-US" sz="3600" b="1" dirty="0"/>
+              <a:t>(</a:t>
+            </a:r>
+            <a:r>
+              <a:rPr lang="en-US" sz="3600" b="1" dirty="0">
                 <a:solidFill>
-                  <a:srgbClr val="00B050"/>
+                  <a:srgbClr val="FFC000"/>
                 </a:solidFill>
               </a:rPr>
-              <a:t>4                       3             5                  </a:t>
-            </a:r>
-            <a:endParaRPr lang="en-US" sz="4800" b="1" dirty="0">
-              <a:solidFill>
-                <a:srgbClr val="00B050"/>
-              </a:solidFill>
-            </a:endParaRPr>
+              <a:t>2</a:t>
+            </a:r>
+            <a:r>
+              <a:rPr lang="en-US" sz="3600" b="1" dirty="0"/>
+              <a:t>/3 </a:t>
+            </a:r>
+            <a:r>
+              <a:rPr lang="en-US" sz="3600" b="1" dirty="0" err="1">
+                <a:solidFill>
+                  <a:srgbClr val="FF0000"/>
+                </a:solidFill>
+              </a:rPr>
+              <a:t>Refusé</a:t>
+            </a:r>
+            <a:r>
+              <a:rPr lang="en-US" sz="3600" b="1" dirty="0"/>
+              <a:t>)</a:t>
+            </a:r>
+            <a:endParaRPr lang="en-US" sz="3600" dirty="0"/>
           </a:p>
         </p:txBody>
       </p:sp>
       <p:sp>
         <p:nvSpPr>
-          <p:cNvPr id="111" name="ZoneTexte 110"/>
+          <p:cNvPr id="73" name="ZoneTexte 72"/>
           <p:cNvSpPr txBox="1"/>
           <p:nvPr/>
         </p:nvSpPr>
         <p:spPr>
           <a:xfrm>
-            <a:off x="2852883" y="6183198"/>
-            <a:ext cx="8849047" cy="830997"/>
+            <a:off x="15206867" y="8438971"/>
+            <a:ext cx="3081133" cy="1200329"/>
           </a:xfrm>
           <a:prstGeom prst="rect">
             <a:avLst/>
@@ -12140,63 +13992,65 @@
           <a:lstStyle/>
           <a:p>
             <a:r>
-              <a:rPr lang="en-US" sz="4800" b="1" dirty="0">
+              <a:rPr lang="en-US" sz="3600" b="1" dirty="0"/>
+              <a:t>{</a:t>
+            </a:r>
+            <a:r>
+              <a:rPr lang="en-US" sz="3600" b="1" dirty="0" smtClean="0"/>
+              <a:t>p2}  </a:t>
+            </a:r>
+            <a:r>
+              <a:rPr lang="en-US" sz="3600" b="1" dirty="0"/>
+              <a:t>-&gt; {</a:t>
+            </a:r>
+            <a:r>
+              <a:rPr lang="en-US" sz="3600" b="1" dirty="0" smtClean="0"/>
+              <a:t>p1,p3}</a:t>
+            </a:r>
+          </a:p>
+          <a:p>
+            <a:r>
+              <a:rPr lang="en-US" sz="3600" b="1" dirty="0"/>
+              <a:t>(</a:t>
+            </a:r>
+            <a:r>
+              <a:rPr lang="en-US" sz="3600" b="1" dirty="0" smtClean="0">
                 <a:solidFill>
-                  <a:srgbClr val="00B050"/>
+                  <a:srgbClr val="FFC000"/>
                 </a:solidFill>
               </a:rPr>
               <a:t>2</a:t>
             </a:r>
             <a:r>
-              <a:rPr lang="en-US" sz="4800" b="1" dirty="0" smtClean="0">
+              <a:rPr lang="en-US" sz="3600" b="1" dirty="0" smtClean="0"/>
+              <a:t>/4 </a:t>
+            </a:r>
+            <a:r>
+              <a:rPr lang="en-US" sz="3600" b="1" dirty="0" err="1">
                 <a:solidFill>
-                  <a:srgbClr val="00B050"/>
+                  <a:srgbClr val="FF0000"/>
                 </a:solidFill>
               </a:rPr>
-              <a:t>                 4                  </a:t>
-            </a:r>
-            <a:r>
-              <a:rPr lang="en-US" sz="4800" b="1" dirty="0" smtClean="0">
-                <a:solidFill>
-                  <a:srgbClr val="00B050"/>
-                </a:solidFill>
-              </a:rPr>
-              <a:t>                    </a:t>
-            </a:r>
-            <a:r>
-              <a:rPr lang="en-US" sz="4800" b="1" dirty="0" smtClean="0">
-                <a:solidFill>
-                  <a:srgbClr val="00B050"/>
-                </a:solidFill>
-              </a:rPr>
-              <a:t>3                   </a:t>
-            </a:r>
-            <a:r>
-              <a:rPr lang="en-US" sz="4800" b="1" dirty="0" smtClean="0">
-                <a:solidFill>
-                  <a:srgbClr val="00B050"/>
-                </a:solidFill>
-              </a:rPr>
-              <a:t>           </a:t>
-            </a:r>
-            <a:endParaRPr lang="en-US" sz="4800" b="1" dirty="0">
-              <a:solidFill>
-                <a:srgbClr val="00B050"/>
-              </a:solidFill>
-            </a:endParaRPr>
+              <a:t>Refusé</a:t>
+            </a:r>
+            <a:r>
+              <a:rPr lang="en-US" sz="3600" b="1" dirty="0"/>
+              <a:t>)</a:t>
+            </a:r>
+            <a:endParaRPr lang="en-US" sz="3600" dirty="0"/>
           </a:p>
         </p:txBody>
       </p:sp>
       <p:sp>
         <p:nvSpPr>
-          <p:cNvPr id="112" name="ZoneTexte 111"/>
+          <p:cNvPr id="69" name="ZoneTexte 68"/>
           <p:cNvSpPr txBox="1"/>
           <p:nvPr/>
         </p:nvSpPr>
         <p:spPr>
           <a:xfrm>
-            <a:off x="4784165" y="7818730"/>
-            <a:ext cx="801227" cy="830997"/>
+            <a:off x="533398" y="7962900"/>
+            <a:ext cx="10287002" cy="1384995"/>
           </a:xfrm>
           <a:prstGeom prst="rect">
             <a:avLst/>
@@ -12210,37 +14064,833 @@
           <a:lstStyle/>
           <a:p>
             <a:r>
-              <a:rPr lang="en-US" sz="4800" b="1" dirty="0">
-                <a:solidFill>
-                  <a:srgbClr val="00B050"/>
-                </a:solidFill>
-              </a:rPr>
-              <a:t>2</a:t>
-            </a:r>
-            <a:r>
-              <a:rPr lang="en-US" sz="4800" b="1" dirty="0" smtClean="0">
-                <a:solidFill>
-                  <a:srgbClr val="00B050"/>
-                </a:solidFill>
-              </a:rPr>
-              <a:t>                          </a:t>
-            </a:r>
-            <a:r>
-              <a:rPr lang="en-US" sz="4800" b="1" dirty="0" smtClean="0">
-                <a:solidFill>
-                  <a:srgbClr val="00B050"/>
-                </a:solidFill>
-              </a:rPr>
-              <a:t>                             </a:t>
-            </a:r>
-            <a:endParaRPr lang="en-US" sz="4800" b="1" dirty="0">
-              <a:solidFill>
-                <a:srgbClr val="00B050"/>
-              </a:solidFill>
-            </a:endParaRPr>
+              <a:rPr lang="fr-FR" sz="2800" dirty="0"/>
+              <a:t>Le support de l’antécédent ne peut que rester stable ou augmenter, la confiance ne peut donc que rester stable ou décroître : la piste peut être stoppée (4 possibilités sont éliminées d’office)</a:t>
+            </a:r>
+            <a:endParaRPr lang="en-US" sz="2800" dirty="0"/>
           </a:p>
         </p:txBody>
       </p:sp>
+      <p:graphicFrame>
+        <p:nvGraphicFramePr>
+          <p:cNvPr id="78" name="Tableau 77"/>
+          <p:cNvGraphicFramePr>
+            <a:graphicFrameLocks noGrp="1"/>
+          </p:cNvGraphicFramePr>
+          <p:nvPr>
+            <p:extLst>
+              <p:ext uri="{D42A27DB-BD31-4B8C-83A1-F6EECF244321}">
+                <p14:modId xmlns:p14="http://schemas.microsoft.com/office/powerpoint/2010/main" val="2730099718"/>
+              </p:ext>
+            </p:extLst>
+          </p:nvPr>
+        </p:nvGraphicFramePr>
+        <p:xfrm>
+          <a:off x="12875448" y="1435654"/>
+          <a:ext cx="5181600" cy="3633266"/>
+        </p:xfrm>
+        <a:graphic>
+          <a:graphicData uri="http://schemas.openxmlformats.org/drawingml/2006/table">
+            <a:tbl>
+              <a:tblPr firstRow="1" bandRow="1">
+                <a:tableStyleId>{5DA37D80-6434-44D0-A028-1B22A696006F}</a:tableStyleId>
+              </a:tblPr>
+              <a:tblGrid>
+                <a:gridCol w="1036320">
+                  <a:extLst>
+                    <a:ext uri="{9D8B030D-6E8A-4147-A177-3AD203B41FA5}">
+                      <a16:colId xmlns:a16="http://schemas.microsoft.com/office/drawing/2014/main" val="1953090983"/>
+                    </a:ext>
+                  </a:extLst>
+                </a:gridCol>
+                <a:gridCol w="1036320">
+                  <a:extLst>
+                    <a:ext uri="{9D8B030D-6E8A-4147-A177-3AD203B41FA5}">
+                      <a16:colId xmlns:a16="http://schemas.microsoft.com/office/drawing/2014/main" val="2805439471"/>
+                    </a:ext>
+                  </a:extLst>
+                </a:gridCol>
+                <a:gridCol w="1036320">
+                  <a:extLst>
+                    <a:ext uri="{9D8B030D-6E8A-4147-A177-3AD203B41FA5}">
+                      <a16:colId xmlns:a16="http://schemas.microsoft.com/office/drawing/2014/main" val="282802788"/>
+                    </a:ext>
+                  </a:extLst>
+                </a:gridCol>
+                <a:gridCol w="1036320">
+                  <a:extLst>
+                    <a:ext uri="{9D8B030D-6E8A-4147-A177-3AD203B41FA5}">
+                      <a16:colId xmlns:a16="http://schemas.microsoft.com/office/drawing/2014/main" val="1379743402"/>
+                    </a:ext>
+                  </a:extLst>
+                </a:gridCol>
+                <a:gridCol w="1036320">
+                  <a:extLst>
+                    <a:ext uri="{9D8B030D-6E8A-4147-A177-3AD203B41FA5}">
+                      <a16:colId xmlns:a16="http://schemas.microsoft.com/office/drawing/2014/main" val="1019358591"/>
+                    </a:ext>
+                  </a:extLst>
+                </a:gridCol>
+              </a:tblGrid>
+              <a:tr h="519038">
+                <a:tc>
+                  <a:txBody>
+                    <a:bodyPr/>
+                    <a:lstStyle/>
+                    <a:p>
+                      <a:pPr algn="ctr"/>
+                      <a:r>
+                        <a:rPr lang="en-US" sz="2400" b="1" dirty="0" err="1" smtClean="0"/>
+                        <a:t>num</a:t>
+                      </a:r>
+                      <a:endParaRPr lang="en-US" sz="2400" b="1" dirty="0"/>
+                    </a:p>
+                  </a:txBody>
+                  <a:tcPr/>
+                </a:tc>
+                <a:tc>
+                  <a:txBody>
+                    <a:bodyPr/>
+                    <a:lstStyle/>
+                    <a:p>
+                      <a:pPr algn="ctr"/>
+                      <a:r>
+                        <a:rPr lang="en-US" sz="2400" b="1" dirty="0" smtClean="0"/>
+                        <a:t>P1</a:t>
+                      </a:r>
+                      <a:endParaRPr lang="en-US" sz="2400" b="1" dirty="0"/>
+                    </a:p>
+                  </a:txBody>
+                  <a:tcPr/>
+                </a:tc>
+                <a:tc>
+                  <a:txBody>
+                    <a:bodyPr/>
+                    <a:lstStyle/>
+                    <a:p>
+                      <a:pPr algn="ctr"/>
+                      <a:r>
+                        <a:rPr lang="en-US" sz="2400" b="1" dirty="0" smtClean="0"/>
+                        <a:t>P2</a:t>
+                      </a:r>
+                      <a:endParaRPr lang="en-US" sz="2400" b="1" dirty="0"/>
+                    </a:p>
+                  </a:txBody>
+                  <a:tcPr/>
+                </a:tc>
+                <a:tc>
+                  <a:txBody>
+                    <a:bodyPr/>
+                    <a:lstStyle/>
+                    <a:p>
+                      <a:pPr algn="ctr"/>
+                      <a:r>
+                        <a:rPr lang="en-US" sz="2400" b="1" dirty="0" smtClean="0"/>
+                        <a:t>P3</a:t>
+                      </a:r>
+                      <a:endParaRPr lang="en-US" sz="2400" b="1" dirty="0"/>
+                    </a:p>
+                  </a:txBody>
+                  <a:tcPr/>
+                </a:tc>
+                <a:tc>
+                  <a:txBody>
+                    <a:bodyPr/>
+                    <a:lstStyle/>
+                    <a:p>
+                      <a:pPr algn="ctr"/>
+                      <a:r>
+                        <a:rPr lang="en-US" sz="2400" b="1" dirty="0" smtClean="0"/>
+                        <a:t>P4</a:t>
+                      </a:r>
+                      <a:endParaRPr lang="en-US" sz="2400" b="1" dirty="0"/>
+                    </a:p>
+                  </a:txBody>
+                  <a:tcPr/>
+                </a:tc>
+                <a:extLst>
+                  <a:ext uri="{0D108BD9-81ED-4DB2-BD59-A6C34878D82A}">
+                    <a16:rowId xmlns:a16="http://schemas.microsoft.com/office/drawing/2014/main" val="593726039"/>
+                  </a:ext>
+                </a:extLst>
+              </a:tr>
+              <a:tr h="519038">
+                <a:tc>
+                  <a:txBody>
+                    <a:bodyPr/>
+                    <a:lstStyle/>
+                    <a:p>
+                      <a:r>
+                        <a:rPr lang="en-US" sz="2400" b="1" dirty="0" smtClean="0"/>
+                        <a:t>01</a:t>
+                      </a:r>
+                      <a:endParaRPr lang="en-US" sz="2400" b="1" dirty="0"/>
+                    </a:p>
+                  </a:txBody>
+                  <a:tcPr/>
+                </a:tc>
+                <a:tc>
+                  <a:txBody>
+                    <a:bodyPr/>
+                    <a:lstStyle/>
+                    <a:p>
+                      <a:r>
+                        <a:rPr lang="en-US" sz="2400" b="1" dirty="0" smtClean="0"/>
+                        <a:t>1</a:t>
+                      </a:r>
+                      <a:endParaRPr lang="en-US" sz="2400" b="1" dirty="0"/>
+                    </a:p>
+                  </a:txBody>
+                  <a:tcPr/>
+                </a:tc>
+                <a:tc>
+                  <a:txBody>
+                    <a:bodyPr/>
+                    <a:lstStyle/>
+                    <a:p>
+                      <a:r>
+                        <a:rPr lang="en-US" sz="2400" b="1" dirty="0" smtClean="0"/>
+                        <a:t>1</a:t>
+                      </a:r>
+                      <a:endParaRPr lang="en-US" sz="2400" b="1" dirty="0"/>
+                    </a:p>
+                  </a:txBody>
+                  <a:tcPr/>
+                </a:tc>
+                <a:tc>
+                  <a:txBody>
+                    <a:bodyPr/>
+                    <a:lstStyle/>
+                    <a:p>
+                      <a:r>
+                        <a:rPr lang="en-US" sz="2400" b="1" dirty="0" smtClean="0"/>
+                        <a:t>1</a:t>
+                      </a:r>
+                      <a:endParaRPr lang="en-US" sz="2400" b="1" dirty="0"/>
+                    </a:p>
+                  </a:txBody>
+                  <a:tcPr/>
+                </a:tc>
+                <a:tc>
+                  <a:txBody>
+                    <a:bodyPr/>
+                    <a:lstStyle/>
+                    <a:p>
+                      <a:r>
+                        <a:rPr lang="en-US" sz="2400" b="1" dirty="0" smtClean="0"/>
+                        <a:t>0</a:t>
+                      </a:r>
+                      <a:endParaRPr lang="en-US" sz="2400" b="1" dirty="0"/>
+                    </a:p>
+                  </a:txBody>
+                  <a:tcPr/>
+                </a:tc>
+                <a:extLst>
+                  <a:ext uri="{0D108BD9-81ED-4DB2-BD59-A6C34878D82A}">
+                    <a16:rowId xmlns:a16="http://schemas.microsoft.com/office/drawing/2014/main" val="289757519"/>
+                  </a:ext>
+                </a:extLst>
+              </a:tr>
+              <a:tr h="519038">
+                <a:tc>
+                  <a:txBody>
+                    <a:bodyPr/>
+                    <a:lstStyle/>
+                    <a:p>
+                      <a:r>
+                        <a:rPr lang="en-US" sz="2400" b="1" dirty="0" smtClean="0"/>
+                        <a:t>02</a:t>
+                      </a:r>
+                      <a:endParaRPr lang="en-US" sz="2400" b="1" dirty="0"/>
+                    </a:p>
+                  </a:txBody>
+                  <a:tcPr/>
+                </a:tc>
+                <a:tc>
+                  <a:txBody>
+                    <a:bodyPr/>
+                    <a:lstStyle/>
+                    <a:p>
+                      <a:r>
+                        <a:rPr lang="en-US" sz="2400" b="1" dirty="0" smtClean="0"/>
+                        <a:t>1</a:t>
+                      </a:r>
+                      <a:endParaRPr lang="en-US" sz="2400" b="1" dirty="0"/>
+                    </a:p>
+                  </a:txBody>
+                  <a:tcPr/>
+                </a:tc>
+                <a:tc>
+                  <a:txBody>
+                    <a:bodyPr/>
+                    <a:lstStyle/>
+                    <a:p>
+                      <a:r>
+                        <a:rPr lang="en-US" sz="2400" b="1" dirty="0" smtClean="0"/>
+                        <a:t>0</a:t>
+                      </a:r>
+                      <a:endParaRPr lang="en-US" sz="2400" b="1" dirty="0"/>
+                    </a:p>
+                  </a:txBody>
+                  <a:tcPr/>
+                </a:tc>
+                <a:tc>
+                  <a:txBody>
+                    <a:bodyPr/>
+                    <a:lstStyle/>
+                    <a:p>
+                      <a:r>
+                        <a:rPr lang="en-US" sz="2400" b="1" dirty="0" smtClean="0"/>
+                        <a:t>1</a:t>
+                      </a:r>
+                      <a:endParaRPr lang="en-US" sz="2400" b="1" dirty="0"/>
+                    </a:p>
+                  </a:txBody>
+                  <a:tcPr/>
+                </a:tc>
+                <a:tc>
+                  <a:txBody>
+                    <a:bodyPr/>
+                    <a:lstStyle/>
+                    <a:p>
+                      <a:r>
+                        <a:rPr lang="en-US" sz="2400" b="1" dirty="0" smtClean="0"/>
+                        <a:t>0</a:t>
+                      </a:r>
+                      <a:endParaRPr lang="en-US" sz="2400" b="1" dirty="0"/>
+                    </a:p>
+                  </a:txBody>
+                  <a:tcPr/>
+                </a:tc>
+                <a:extLst>
+                  <a:ext uri="{0D108BD9-81ED-4DB2-BD59-A6C34878D82A}">
+                    <a16:rowId xmlns:a16="http://schemas.microsoft.com/office/drawing/2014/main" val="1224972536"/>
+                  </a:ext>
+                </a:extLst>
+              </a:tr>
+              <a:tr h="519038">
+                <a:tc>
+                  <a:txBody>
+                    <a:bodyPr/>
+                    <a:lstStyle/>
+                    <a:p>
+                      <a:r>
+                        <a:rPr lang="en-US" sz="2400" b="1" dirty="0" smtClean="0"/>
+                        <a:t>03</a:t>
+                      </a:r>
+                      <a:endParaRPr lang="en-US" sz="2400" b="1" dirty="0"/>
+                    </a:p>
+                  </a:txBody>
+                  <a:tcPr/>
+                </a:tc>
+                <a:tc>
+                  <a:txBody>
+                    <a:bodyPr/>
+                    <a:lstStyle/>
+                    <a:p>
+                      <a:r>
+                        <a:rPr lang="en-US" sz="2400" b="1" dirty="0" smtClean="0"/>
+                        <a:t>1</a:t>
+                      </a:r>
+                      <a:endParaRPr lang="en-US" sz="2400" b="1" dirty="0"/>
+                    </a:p>
+                  </a:txBody>
+                  <a:tcPr/>
+                </a:tc>
+                <a:tc>
+                  <a:txBody>
+                    <a:bodyPr/>
+                    <a:lstStyle/>
+                    <a:p>
+                      <a:r>
+                        <a:rPr lang="en-US" sz="2400" b="1" dirty="0" smtClean="0"/>
+                        <a:t>1</a:t>
+                      </a:r>
+                      <a:endParaRPr lang="en-US" sz="2400" b="1" dirty="0"/>
+                    </a:p>
+                  </a:txBody>
+                  <a:tcPr/>
+                </a:tc>
+                <a:tc>
+                  <a:txBody>
+                    <a:bodyPr/>
+                    <a:lstStyle/>
+                    <a:p>
+                      <a:r>
+                        <a:rPr lang="en-US" sz="2400" b="1" dirty="0" smtClean="0"/>
+                        <a:t>1</a:t>
+                      </a:r>
+                      <a:endParaRPr lang="en-US" sz="2400" b="1" dirty="0"/>
+                    </a:p>
+                  </a:txBody>
+                  <a:tcPr/>
+                </a:tc>
+                <a:tc>
+                  <a:txBody>
+                    <a:bodyPr/>
+                    <a:lstStyle/>
+                    <a:p>
+                      <a:r>
+                        <a:rPr lang="en-US" sz="2400" b="1" dirty="0" smtClean="0"/>
+                        <a:t>0</a:t>
+                      </a:r>
+                      <a:endParaRPr lang="en-US" sz="2400" b="1" dirty="0"/>
+                    </a:p>
+                  </a:txBody>
+                  <a:tcPr/>
+                </a:tc>
+                <a:extLst>
+                  <a:ext uri="{0D108BD9-81ED-4DB2-BD59-A6C34878D82A}">
+                    <a16:rowId xmlns:a16="http://schemas.microsoft.com/office/drawing/2014/main" val="1938161857"/>
+                  </a:ext>
+                </a:extLst>
+              </a:tr>
+              <a:tr h="519038">
+                <a:tc>
+                  <a:txBody>
+                    <a:bodyPr/>
+                    <a:lstStyle/>
+                    <a:p>
+                      <a:r>
+                        <a:rPr lang="en-US" sz="2400" b="1" dirty="0" smtClean="0"/>
+                        <a:t>04</a:t>
+                      </a:r>
+                      <a:endParaRPr lang="en-US" sz="2400" b="1" dirty="0"/>
+                    </a:p>
+                  </a:txBody>
+                  <a:tcPr/>
+                </a:tc>
+                <a:tc>
+                  <a:txBody>
+                    <a:bodyPr/>
+                    <a:lstStyle/>
+                    <a:p>
+                      <a:r>
+                        <a:rPr lang="en-US" sz="2400" b="1" dirty="0" smtClean="0"/>
+                        <a:t>1</a:t>
+                      </a:r>
+                      <a:endParaRPr lang="en-US" sz="2400" b="1" dirty="0"/>
+                    </a:p>
+                  </a:txBody>
+                  <a:tcPr/>
+                </a:tc>
+                <a:tc>
+                  <a:txBody>
+                    <a:bodyPr/>
+                    <a:lstStyle/>
+                    <a:p>
+                      <a:r>
+                        <a:rPr lang="en-US" sz="2400" b="1" dirty="0" smtClean="0"/>
+                        <a:t>1</a:t>
+                      </a:r>
+                      <a:endParaRPr lang="en-US" sz="2400" b="1" dirty="0"/>
+                    </a:p>
+                  </a:txBody>
+                  <a:tcPr/>
+                </a:tc>
+                <a:tc>
+                  <a:txBody>
+                    <a:bodyPr/>
+                    <a:lstStyle/>
+                    <a:p>
+                      <a:r>
+                        <a:rPr lang="en-US" sz="2400" b="1" dirty="0" smtClean="0"/>
+                        <a:t>0</a:t>
+                      </a:r>
+                      <a:endParaRPr lang="en-US" sz="2400" b="1" dirty="0"/>
+                    </a:p>
+                  </a:txBody>
+                  <a:tcPr/>
+                </a:tc>
+                <a:tc>
+                  <a:txBody>
+                    <a:bodyPr/>
+                    <a:lstStyle/>
+                    <a:p>
+                      <a:r>
+                        <a:rPr lang="en-US" sz="2400" b="1" dirty="0" smtClean="0"/>
+                        <a:t>0</a:t>
+                      </a:r>
+                      <a:endParaRPr lang="en-US" sz="2400" b="1" dirty="0"/>
+                    </a:p>
+                  </a:txBody>
+                  <a:tcPr/>
+                </a:tc>
+                <a:extLst>
+                  <a:ext uri="{0D108BD9-81ED-4DB2-BD59-A6C34878D82A}">
+                    <a16:rowId xmlns:a16="http://schemas.microsoft.com/office/drawing/2014/main" val="2586922304"/>
+                  </a:ext>
+                </a:extLst>
+              </a:tr>
+              <a:tr h="519038">
+                <a:tc>
+                  <a:txBody>
+                    <a:bodyPr/>
+                    <a:lstStyle/>
+                    <a:p>
+                      <a:r>
+                        <a:rPr lang="en-US" sz="2400" b="1" dirty="0" smtClean="0"/>
+                        <a:t>05</a:t>
+                      </a:r>
+                      <a:endParaRPr lang="en-US" sz="2400" b="1" dirty="0"/>
+                    </a:p>
+                  </a:txBody>
+                  <a:tcPr/>
+                </a:tc>
+                <a:tc>
+                  <a:txBody>
+                    <a:bodyPr/>
+                    <a:lstStyle/>
+                    <a:p>
+                      <a:r>
+                        <a:rPr lang="en-US" sz="2400" b="1" dirty="0" smtClean="0"/>
+                        <a:t>0</a:t>
+                      </a:r>
+                      <a:endParaRPr lang="en-US" sz="2400" b="1" dirty="0"/>
+                    </a:p>
+                  </a:txBody>
+                  <a:tcPr/>
+                </a:tc>
+                <a:tc>
+                  <a:txBody>
+                    <a:bodyPr/>
+                    <a:lstStyle/>
+                    <a:p>
+                      <a:r>
+                        <a:rPr lang="en-US" sz="2400" b="1" dirty="0" smtClean="0"/>
+                        <a:t>1</a:t>
+                      </a:r>
+                      <a:endParaRPr lang="en-US" sz="2400" b="1" dirty="0"/>
+                    </a:p>
+                  </a:txBody>
+                  <a:tcPr/>
+                </a:tc>
+                <a:tc>
+                  <a:txBody>
+                    <a:bodyPr/>
+                    <a:lstStyle/>
+                    <a:p>
+                      <a:r>
+                        <a:rPr lang="en-US" sz="2400" b="1" dirty="0" smtClean="0"/>
+                        <a:t>1</a:t>
+                      </a:r>
+                      <a:endParaRPr lang="en-US" sz="2400" b="1" dirty="0"/>
+                    </a:p>
+                  </a:txBody>
+                  <a:tcPr/>
+                </a:tc>
+                <a:tc>
+                  <a:txBody>
+                    <a:bodyPr/>
+                    <a:lstStyle/>
+                    <a:p>
+                      <a:r>
+                        <a:rPr lang="en-US" sz="2400" b="1" dirty="0" smtClean="0"/>
+                        <a:t>0</a:t>
+                      </a:r>
+                      <a:endParaRPr lang="en-US" sz="2400" b="1" dirty="0"/>
+                    </a:p>
+                  </a:txBody>
+                  <a:tcPr/>
+                </a:tc>
+                <a:extLst>
+                  <a:ext uri="{0D108BD9-81ED-4DB2-BD59-A6C34878D82A}">
+                    <a16:rowId xmlns:a16="http://schemas.microsoft.com/office/drawing/2014/main" val="3489723564"/>
+                  </a:ext>
+                </a:extLst>
+              </a:tr>
+              <a:tr h="519038">
+                <a:tc>
+                  <a:txBody>
+                    <a:bodyPr/>
+                    <a:lstStyle/>
+                    <a:p>
+                      <a:r>
+                        <a:rPr lang="en-US" sz="2400" b="1" dirty="0" smtClean="0"/>
+                        <a:t>06</a:t>
+                      </a:r>
+                      <a:endParaRPr lang="en-US" sz="2400" b="1" dirty="0"/>
+                    </a:p>
+                  </a:txBody>
+                  <a:tcPr/>
+                </a:tc>
+                <a:tc>
+                  <a:txBody>
+                    <a:bodyPr/>
+                    <a:lstStyle/>
+                    <a:p>
+                      <a:r>
+                        <a:rPr lang="en-US" sz="2400" b="1" dirty="0" smtClean="0"/>
+                        <a:t>0</a:t>
+                      </a:r>
+                      <a:endParaRPr lang="en-US" sz="2400" b="1" dirty="0"/>
+                    </a:p>
+                  </a:txBody>
+                  <a:tcPr/>
+                </a:tc>
+                <a:tc>
+                  <a:txBody>
+                    <a:bodyPr/>
+                    <a:lstStyle/>
+                    <a:p>
+                      <a:r>
+                        <a:rPr lang="en-US" sz="2400" b="1" dirty="0" smtClean="0"/>
+                        <a:t>0</a:t>
+                      </a:r>
+                      <a:endParaRPr lang="en-US" sz="2400" b="1" dirty="0"/>
+                    </a:p>
+                  </a:txBody>
+                  <a:tcPr/>
+                </a:tc>
+                <a:tc>
+                  <a:txBody>
+                    <a:bodyPr/>
+                    <a:lstStyle/>
+                    <a:p>
+                      <a:r>
+                        <a:rPr lang="en-US" sz="2400" b="1" dirty="0" smtClean="0"/>
+                        <a:t>0</a:t>
+                      </a:r>
+                      <a:endParaRPr lang="en-US" sz="2400" b="1" dirty="0"/>
+                    </a:p>
+                  </a:txBody>
+                  <a:tcPr/>
+                </a:tc>
+                <a:tc>
+                  <a:txBody>
+                    <a:bodyPr/>
+                    <a:lstStyle/>
+                    <a:p>
+                      <a:r>
+                        <a:rPr lang="en-US" sz="2400" b="1" dirty="0" smtClean="0"/>
+                        <a:t>1</a:t>
+                      </a:r>
+                      <a:endParaRPr lang="en-US" sz="2400" b="1" dirty="0"/>
+                    </a:p>
+                  </a:txBody>
+                  <a:tcPr/>
+                </a:tc>
+                <a:extLst>
+                  <a:ext uri="{0D108BD9-81ED-4DB2-BD59-A6C34878D82A}">
+                    <a16:rowId xmlns:a16="http://schemas.microsoft.com/office/drawing/2014/main" val="3442202262"/>
+                  </a:ext>
+                </a:extLst>
+              </a:tr>
+            </a:tbl>
+          </a:graphicData>
+        </a:graphic>
+      </p:graphicFrame>
+    </p:spTree>
+    <p:extLst>
+      <p:ext uri="{BB962C8B-B14F-4D97-AF65-F5344CB8AC3E}">
+        <p14:creationId xmlns:p14="http://schemas.microsoft.com/office/powerpoint/2010/main" val="4294125597"/>
+      </p:ext>
+    </p:extLst>
+  </p:cSld>
+  <p:clrMapOvr>
+    <a:masterClrMapping/>
+  </p:clrMapOvr>
+  <p:timing>
+    <p:tnLst>
+      <p:par>
+        <p:cTn id="1" dur="indefinite" restart="never" nodeType="tmRoot"/>
+      </p:par>
+    </p:tnLst>
+  </p:timing>
+</p:sld>
+</file>
+
+<file path=ppt/slides/slide15.xml><?xml version="1.0" encoding="utf-8"?>
+<p:sld xmlns:a="http://schemas.openxmlformats.org/drawingml/2006/main" xmlns:r="http://schemas.openxmlformats.org/officeDocument/2006/relationships" xmlns:p="http://schemas.openxmlformats.org/presentationml/2006/main">
+  <p:cSld>
+    <p:spTree>
+      <p:nvGrpSpPr>
+        <p:cNvPr id="1" name=""/>
+        <p:cNvGrpSpPr/>
+        <p:nvPr/>
+      </p:nvGrpSpPr>
+      <p:grpSpPr>
+        <a:xfrm>
+          <a:off x="0" y="0"/>
+          <a:ext cx="0" cy="0"/>
+          <a:chOff x="0" y="0"/>
+          <a:chExt cx="0" cy="0"/>
+        </a:xfrm>
+      </p:grpSpPr>
+      <p:sp>
+        <p:nvSpPr>
+          <p:cNvPr id="3" name="object 3"/>
+          <p:cNvSpPr/>
+          <p:nvPr/>
+        </p:nvSpPr>
+        <p:spPr>
+          <a:xfrm>
+            <a:off x="-32870" y="-16936"/>
+            <a:ext cx="18288000" cy="10287000"/>
+          </a:xfrm>
+          <a:custGeom>
+            <a:avLst/>
+            <a:gdLst/>
+            <a:ahLst/>
+            <a:cxnLst/>
+            <a:rect l="l" t="t" r="r" b="b"/>
+            <a:pathLst>
+              <a:path w="10925810" h="10287000">
+                <a:moveTo>
+                  <a:pt x="0" y="10286999"/>
+                </a:moveTo>
+                <a:lnTo>
+                  <a:pt x="10925328" y="10286999"/>
+                </a:lnTo>
+                <a:lnTo>
+                  <a:pt x="10925328" y="0"/>
+                </a:lnTo>
+                <a:lnTo>
+                  <a:pt x="0" y="0"/>
+                </a:lnTo>
+                <a:lnTo>
+                  <a:pt x="0" y="10286999"/>
+                </a:lnTo>
+                <a:close/>
+              </a:path>
+            </a:pathLst>
+          </a:custGeom>
+          <a:solidFill>
+            <a:srgbClr val="F5EDE7"/>
+          </a:solidFill>
+        </p:spPr>
+        <p:txBody>
+          <a:bodyPr wrap="square" lIns="0" tIns="0" rIns="0" bIns="0" rtlCol="0"/>
+          <a:lstStyle/>
+          <a:p>
+            <a:endParaRPr/>
+          </a:p>
+        </p:txBody>
+      </p:sp>
+      <p:sp>
+        <p:nvSpPr>
+          <p:cNvPr id="11" name="object 6"/>
+          <p:cNvSpPr/>
+          <p:nvPr/>
+        </p:nvSpPr>
+        <p:spPr>
+          <a:xfrm>
+            <a:off x="2289944" y="13117"/>
+            <a:ext cx="13178656" cy="1105544"/>
+          </a:xfrm>
+          <a:custGeom>
+            <a:avLst/>
+            <a:gdLst/>
+            <a:ahLst/>
+            <a:cxnLst/>
+            <a:rect l="l" t="t" r="r" b="b"/>
+            <a:pathLst>
+              <a:path w="5067300" h="4762500">
+                <a:moveTo>
+                  <a:pt x="0" y="0"/>
+                </a:moveTo>
+                <a:lnTo>
+                  <a:pt x="5067299" y="0"/>
+                </a:lnTo>
+                <a:lnTo>
+                  <a:pt x="5067299" y="4762499"/>
+                </a:lnTo>
+                <a:lnTo>
+                  <a:pt x="0" y="4762499"/>
+                </a:lnTo>
+                <a:lnTo>
+                  <a:pt x="0" y="0"/>
+                </a:lnTo>
+                <a:close/>
+              </a:path>
+            </a:pathLst>
+          </a:custGeom>
+          <a:solidFill>
+            <a:srgbClr val="D5B9AE"/>
+          </a:solidFill>
+        </p:spPr>
+        <p:txBody>
+          <a:bodyPr wrap="square" lIns="0" tIns="0" rIns="0" bIns="0" rtlCol="0"/>
+          <a:lstStyle/>
+          <a:p>
+            <a:pPr marL="12700">
+              <a:lnSpc>
+                <a:spcPct val="100000"/>
+              </a:lnSpc>
+              <a:spcBef>
+                <a:spcPts val="5"/>
+              </a:spcBef>
+              <a:tabLst>
+                <a:tab pos="1899285" algn="l"/>
+              </a:tabLst>
+            </a:pPr>
+            <a:endParaRPr lang="en-US" dirty="0">
+              <a:latin typeface="Palatino Linotype"/>
+              <a:cs typeface="Palatino Linotype"/>
+            </a:endParaRPr>
+          </a:p>
+        </p:txBody>
+      </p:sp>
+      <p:sp>
+        <p:nvSpPr>
+          <p:cNvPr id="12" name="ZoneTexte 11"/>
+          <p:cNvSpPr txBox="1"/>
+          <p:nvPr/>
+        </p:nvSpPr>
+        <p:spPr>
+          <a:xfrm>
+            <a:off x="5943600" y="68734"/>
+            <a:ext cx="4310530" cy="769441"/>
+          </a:xfrm>
+          <a:prstGeom prst="rect">
+            <a:avLst/>
+          </a:prstGeom>
+          <a:noFill/>
+        </p:spPr>
+        <p:txBody>
+          <a:bodyPr wrap="square" rtlCol="0">
+            <a:spAutoFit/>
+          </a:bodyPr>
+          <a:lstStyle/>
+          <a:p>
+            <a:r>
+              <a:rPr lang="en-US" sz="4400" b="1" dirty="0" smtClean="0"/>
+              <a:t>EXEMPLE (Suite)</a:t>
+            </a:r>
+            <a:endParaRPr lang="en-US" sz="4400" b="1" dirty="0"/>
+          </a:p>
+        </p:txBody>
+      </p:sp>
+      <p:pic>
+        <p:nvPicPr>
+          <p:cNvPr id="15" name="Image 14"/>
+          <p:cNvPicPr>
+            <a:picLocks noChangeAspect="1"/>
+          </p:cNvPicPr>
+          <p:nvPr/>
+        </p:nvPicPr>
+        <p:blipFill>
+          <a:blip r:embed="rId3" cstate="print">
+            <a:extLst>
+              <a:ext uri="{28A0092B-C50C-407E-A947-70E740481C1C}">
+                <a14:useLocalDpi xmlns:a14="http://schemas.microsoft.com/office/drawing/2010/main" val="0"/>
+              </a:ext>
+            </a:extLst>
+          </a:blip>
+          <a:stretch>
+            <a:fillRect/>
+          </a:stretch>
+        </p:blipFill>
+        <p:spPr>
+          <a:xfrm>
+            <a:off x="10289107" y="152749"/>
+            <a:ext cx="1488760" cy="701041"/>
+          </a:xfrm>
+          <a:prstGeom prst="rect">
+            <a:avLst/>
+          </a:prstGeom>
+        </p:spPr>
+      </p:pic>
       <p:sp>
         <p:nvSpPr>
           <p:cNvPr id="114" name="ZoneTexte 113"/>
@@ -12269,7 +14919,7 @@
                   <a:srgbClr val="C00000"/>
                 </a:solidFill>
               </a:rPr>
-              <a:t>Extraction des </a:t>
+              <a:t>Mesure d`évaluation des </a:t>
             </a:r>
             <a:r>
               <a:rPr lang="fr-FR" sz="3200" b="1" i="1" dirty="0" err="1" smtClean="0">
@@ -12277,7 +14927,7 @@
                   <a:srgbClr val="C00000"/>
                 </a:solidFill>
               </a:rPr>
-              <a:t>Regles</a:t>
+              <a:t>regles</a:t>
             </a:r>
             <a:endParaRPr lang="en-US" sz="3200" b="1" i="1" dirty="0">
               <a:solidFill>
@@ -12287,56 +14937,10 @@
           </a:p>
         </p:txBody>
       </p:sp>
-      <p:sp>
-        <p:nvSpPr>
-          <p:cNvPr id="24" name="ZoneTexte 23"/>
-          <p:cNvSpPr txBox="1"/>
-          <p:nvPr/>
-        </p:nvSpPr>
-        <p:spPr>
-          <a:xfrm>
-            <a:off x="11917353" y="2104997"/>
-            <a:ext cx="3335722" cy="769441"/>
-          </a:xfrm>
-          <a:prstGeom prst="rect">
-            <a:avLst/>
-          </a:prstGeom>
-          <a:noFill/>
-        </p:spPr>
-        <p:txBody>
-          <a:bodyPr wrap="square" rtlCol="0">
-            <a:spAutoFit/>
-          </a:bodyPr>
-          <a:lstStyle/>
-          <a:p>
-            <a:r>
-              <a:rPr lang="fr-FR" sz="4400" b="1" dirty="0" err="1">
-                <a:solidFill>
-                  <a:srgbClr val="00B050"/>
-                </a:solidFill>
-              </a:rPr>
-              <a:t>sup.min</a:t>
-            </a:r>
-            <a:r>
-              <a:rPr lang="fr-FR" sz="4400" b="1" dirty="0">
-                <a:solidFill>
-                  <a:srgbClr val="00B050"/>
-                </a:solidFill>
-              </a:rPr>
-              <a:t> = 2 </a:t>
-            </a:r>
-            <a:endParaRPr lang="en-US" sz="4400" b="1" dirty="0">
-              <a:solidFill>
-                <a:srgbClr val="00B050"/>
-              </a:solidFill>
-            </a:endParaRPr>
-          </a:p>
-        </p:txBody>
-      </p:sp>
     </p:spTree>
     <p:extLst>
       <p:ext uri="{BB962C8B-B14F-4D97-AF65-F5344CB8AC3E}">
-        <p14:creationId xmlns:p14="http://schemas.microsoft.com/office/powerpoint/2010/main" val="1373115983"/>
+        <p14:creationId xmlns:p14="http://schemas.microsoft.com/office/powerpoint/2010/main" val="1674209205"/>
       </p:ext>
     </p:extLst>
   </p:cSld>
@@ -21052,21 +23656,13 @@
             </a:r>
             <a:r>
               <a:rPr lang="en-US" sz="2400" b="1" dirty="0" smtClean="0"/>
-              <a:t>(x</a:t>
-            </a:r>
+              <a:t>(x&lt;-y)=</a:t>
+            </a:r>
+          </a:p>
+          <a:p>
             <a:r>
               <a:rPr lang="en-US" sz="2400" b="1" dirty="0" smtClean="0"/>
-              <a:t>&lt;-y)=</a:t>
-            </a:r>
-          </a:p>
-          <a:p>
-            <a:r>
-              <a:rPr lang="en-US" sz="2400" b="1" dirty="0" smtClean="0"/>
-              <a:t>Sup(X </a:t>
-            </a:r>
-            <a:r>
-              <a:rPr lang="en-US" sz="2400" b="1" dirty="0" smtClean="0"/>
-              <a:t>&amp; Y) / sup(X)</a:t>
+              <a:t>Sup(X &amp; Y) / sup(X)</a:t>
             </a:r>
           </a:p>
           <a:p>
@@ -21528,7 +24124,6 @@
               <a:rPr lang="en-US" sz="2400" b="1" dirty="0" smtClean="0"/>
               <a:t>Items Frequents</a:t>
             </a:r>
-            <a:endParaRPr lang="en-US" sz="2400" b="1" dirty="0" smtClean="0"/>
           </a:p>
           <a:p>
             <a:endParaRPr lang="en-US" sz="3200" dirty="0"/>
@@ -22415,13 +25010,13 @@
           <p:nvPr>
             <p:extLst>
               <p:ext uri="{D42A27DB-BD31-4B8C-83A1-F6EECF244321}">
-                <p14:modId xmlns:p14="http://schemas.microsoft.com/office/powerpoint/2010/main" val="171348336"/>
+                <p14:modId xmlns:p14="http://schemas.microsoft.com/office/powerpoint/2010/main" val="1083879748"/>
               </p:ext>
             </p:extLst>
           </p:nvPr>
         </p:nvGraphicFramePr>
         <p:xfrm>
-          <a:off x="535770" y="2773350"/>
+          <a:off x="457200" y="2773350"/>
           <a:ext cx="8229600" cy="701040"/>
         </p:xfrm>
         <a:graphic>

</xml_diff>